<commit_message>
Added Chancen & Risiken
</commit_message>
<xml_diff>
--- a/documents/projectmanagement/Allgemeines/Machbarkeitsstudie.pptx
+++ b/documents/projectmanagement/Allgemeines/Machbarkeitsstudie.pptx
@@ -15,7 +15,8 @@
     <p:sldId id="263" r:id="rId9"/>
     <p:sldId id="267" r:id="rId10"/>
     <p:sldId id="264" r:id="rId11"/>
-    <p:sldId id="266" r:id="rId12"/>
+    <p:sldId id="268" r:id="rId12"/>
+    <p:sldId id="266" r:id="rId13"/>
   </p:sldIdLst>
   <p:sldSz cx="12192000" cy="6858000"/>
   <p:notesSz cx="6858000" cy="9144000"/>
@@ -3804,9 +3805,9 @@
     <dgm:cxn modelId="{E85D5463-7228-41A9-888A-9EC366987151}" srcId="{6217A406-CCAC-4760-A132-823320E7C8AA}" destId="{A8DD8037-4DB6-470D-8714-9A3918A2AA88}" srcOrd="0" destOrd="0" parTransId="{82353E00-898A-4479-BD1A-370A77D87C99}" sibTransId="{A267CE71-DF80-4788-9F14-E573AADD3E40}"/>
     <dgm:cxn modelId="{ECFEB97A-43D7-444C-B0EA-72B81C62A6C0}" srcId="{03A8BDC9-669F-4918-A9DE-106A769820D1}" destId="{360A8656-2B98-4847-8F25-D5D3168CA0D1}" srcOrd="1" destOrd="0" parTransId="{86358050-89CD-4349-B74B-9DD9CD9BA9A8}" sibTransId="{75247C5B-8F9E-45FF-B498-3C4C035E6B74}"/>
     <dgm:cxn modelId="{C11BD460-D82F-48C7-A866-6C4480D7932A}" type="presOf" srcId="{00126DA2-E8A9-44CA-85AD-A6CB396B82C5}" destId="{1C4F9093-FE47-4554-A822-B92A4C0EC2A7}" srcOrd="0" destOrd="0" presId="urn:microsoft.com/office/officeart/2005/8/layout/arrow2"/>
+    <dgm:cxn modelId="{4B47EB8C-5E19-4988-9BA6-AC4A66744EE6}" srcId="{0AE2193A-BCD4-4946-9B53-3FCAAF9851C5}" destId="{3F888F01-DCE4-4AA3-81A6-3CA974F7DEED}" srcOrd="2" destOrd="0" parTransId="{F8AF2A7E-D40F-4EF0-A289-6116C58B8397}" sibTransId="{A86B9379-31F6-434F-AE6D-F6EA41D9E54B}"/>
+    <dgm:cxn modelId="{296EF577-D74A-46D9-B1C2-3BFEB87C743D}" type="presOf" srcId="{A8DD8037-4DB6-470D-8714-9A3918A2AA88}" destId="{8F7A122F-A032-49E6-AAC7-9B138367453A}" srcOrd="0" destOrd="1" presId="urn:microsoft.com/office/officeart/2005/8/layout/arrow2"/>
     <dgm:cxn modelId="{5170D23C-6CF2-4C5A-BED6-20ABA304C401}" type="presOf" srcId="{EC43F636-1A5B-45CE-867C-21BB2A8C9979}" destId="{55D03CFC-8164-4FA7-8D3A-0BF5D70844C3}" srcOrd="0" destOrd="1" presId="urn:microsoft.com/office/officeart/2005/8/layout/arrow2"/>
-    <dgm:cxn modelId="{296EF577-D74A-46D9-B1C2-3BFEB87C743D}" type="presOf" srcId="{A8DD8037-4DB6-470D-8714-9A3918A2AA88}" destId="{8F7A122F-A032-49E6-AAC7-9B138367453A}" srcOrd="0" destOrd="1" presId="urn:microsoft.com/office/officeart/2005/8/layout/arrow2"/>
-    <dgm:cxn modelId="{4B47EB8C-5E19-4988-9BA6-AC4A66744EE6}" srcId="{0AE2193A-BCD4-4946-9B53-3FCAAF9851C5}" destId="{3F888F01-DCE4-4AA3-81A6-3CA974F7DEED}" srcOrd="2" destOrd="0" parTransId="{F8AF2A7E-D40F-4EF0-A289-6116C58B8397}" sibTransId="{A86B9379-31F6-434F-AE6D-F6EA41D9E54B}"/>
     <dgm:cxn modelId="{AAF496FB-B2D6-4F55-9D64-A9D1B532DE13}" type="presParOf" srcId="{774104AD-7E53-4E32-B515-B77A8A985716}" destId="{8EFB4082-6FA8-467F-B4A4-1D865061D7EB}" srcOrd="0" destOrd="0" presId="urn:microsoft.com/office/officeart/2005/8/layout/arrow2"/>
     <dgm:cxn modelId="{19C067C1-98AB-46EA-9532-50D475C7306F}" type="presParOf" srcId="{774104AD-7E53-4E32-B515-B77A8A985716}" destId="{2AB02C00-8A31-40E5-A971-475D350A9809}" srcOrd="1" destOrd="0" presId="urn:microsoft.com/office/officeart/2005/8/layout/arrow2"/>
     <dgm:cxn modelId="{67734BBC-6FDD-4787-BCB3-721DA787E5CA}" type="presParOf" srcId="{2AB02C00-8A31-40E5-A971-475D350A9809}" destId="{490D4099-2E4E-45B8-A269-26396529A523}" srcOrd="0" destOrd="0" presId="urn:microsoft.com/office/officeart/2005/8/layout/arrow2"/>
@@ -4702,6 +4703,13 @@
         </dgm:presLayoutVars>
       </dgm:prSet>
       <dgm:spPr/>
+      <dgm:t>
+        <a:bodyPr/>
+        <a:lstStyle/>
+        <a:p>
+          <a:endParaRPr lang="de-DE"/>
+        </a:p>
+      </dgm:t>
     </dgm:pt>
     <dgm:pt modelId="{2BF15467-0E49-4845-904D-0CEFB46FA313}" type="pres">
       <dgm:prSet presAssocID="{7EFAC483-52A1-4FF3-AF0F-C65D80827B7A}" presName="node" presStyleLbl="node1" presStyleIdx="0" presStyleCnt="5">
@@ -4710,6 +4718,13 @@
         </dgm:presLayoutVars>
       </dgm:prSet>
       <dgm:spPr/>
+      <dgm:t>
+        <a:bodyPr/>
+        <a:lstStyle/>
+        <a:p>
+          <a:endParaRPr lang="de-DE"/>
+        </a:p>
+      </dgm:t>
     </dgm:pt>
     <dgm:pt modelId="{CE49FF10-9C73-4AAF-9F9F-01A033196531}" type="pres">
       <dgm:prSet presAssocID="{1AC432B5-7033-48C2-83F8-D24B330F2E49}" presName="sibTrans" presStyleCnt="0"/>
@@ -4722,6 +4737,13 @@
         </dgm:presLayoutVars>
       </dgm:prSet>
       <dgm:spPr/>
+      <dgm:t>
+        <a:bodyPr/>
+        <a:lstStyle/>
+        <a:p>
+          <a:endParaRPr lang="de-DE"/>
+        </a:p>
+      </dgm:t>
     </dgm:pt>
     <dgm:pt modelId="{ACFC943D-D73B-4F0B-B942-6C8DC638F537}" type="pres">
       <dgm:prSet presAssocID="{E158C9E0-4042-476F-AE76-AF0E2A50D85F}" presName="sibTrans" presStyleCnt="0"/>
@@ -4753,6 +4775,13 @@
         </dgm:presLayoutVars>
       </dgm:prSet>
       <dgm:spPr/>
+      <dgm:t>
+        <a:bodyPr/>
+        <a:lstStyle/>
+        <a:p>
+          <a:endParaRPr lang="de-DE"/>
+        </a:p>
+      </dgm:t>
     </dgm:pt>
     <dgm:pt modelId="{2BE44C39-A8A9-46C1-A89E-9D213F9FD792}" type="pres">
       <dgm:prSet presAssocID="{F0868AD7-D4D4-4F6F-9B58-9EC513994B5A}" presName="sibTrans" presStyleCnt="0"/>
@@ -5281,778 +5310,6 @@
       <dsp:cNvGrpSpPr/>
     </dsp:nvGrpSpPr>
     <dsp:grpSpPr/>
-    <dsp:sp modelId="{8EFB4082-6FA8-467F-B4A4-1D865061D7EB}">
-      <dsp:nvSpPr>
-        <dsp:cNvPr id="0" name=""/>
-        <dsp:cNvSpPr/>
-      </dsp:nvSpPr>
-      <dsp:spPr>
-        <a:xfrm>
-          <a:off x="1776729" y="0"/>
-          <a:ext cx="6962140" cy="4351338"/>
-        </a:xfrm>
-        <a:prstGeom prst="swooshArrow">
-          <a:avLst>
-            <a:gd name="adj1" fmla="val 25000"/>
-            <a:gd name="adj2" fmla="val 25000"/>
-          </a:avLst>
-        </a:prstGeom>
-        <a:solidFill>
-          <a:schemeClr val="accent1">
-            <a:tint val="40000"/>
-            <a:hueOff val="0"/>
-            <a:satOff val="0"/>
-            <a:lumOff val="0"/>
-            <a:alphaOff val="0"/>
-          </a:schemeClr>
-        </a:solidFill>
-        <a:ln>
-          <a:noFill/>
-        </a:ln>
-        <a:effectLst/>
-      </dsp:spPr>
-      <dsp:style>
-        <a:lnRef idx="0">
-          <a:scrgbClr r="0" g="0" b="0"/>
-        </a:lnRef>
-        <a:fillRef idx="1">
-          <a:scrgbClr r="0" g="0" b="0"/>
-        </a:fillRef>
-        <a:effectRef idx="0">
-          <a:scrgbClr r="0" g="0" b="0"/>
-        </a:effectRef>
-        <a:fontRef idx="minor"/>
-      </dsp:style>
-    </dsp:sp>
-    <dsp:sp modelId="{490D4099-2E4E-45B8-A269-26396529A523}">
-      <dsp:nvSpPr>
-        <dsp:cNvPr id="0" name=""/>
-        <dsp:cNvSpPr/>
-      </dsp:nvSpPr>
-      <dsp:spPr>
-        <a:xfrm>
-          <a:off x="2462500" y="3235654"/>
-          <a:ext cx="160129" cy="160129"/>
-        </a:xfrm>
-        <a:prstGeom prst="ellipse">
-          <a:avLst/>
-        </a:prstGeom>
-        <a:solidFill>
-          <a:schemeClr val="accent1">
-            <a:hueOff val="0"/>
-            <a:satOff val="0"/>
-            <a:lumOff val="0"/>
-            <a:alphaOff val="0"/>
-          </a:schemeClr>
-        </a:solidFill>
-        <a:ln w="12700" cap="flat" cmpd="sng" algn="ctr">
-          <a:solidFill>
-            <a:schemeClr val="lt1">
-              <a:hueOff val="0"/>
-              <a:satOff val="0"/>
-              <a:lumOff val="0"/>
-              <a:alphaOff val="0"/>
-            </a:schemeClr>
-          </a:solidFill>
-          <a:prstDash val="solid"/>
-          <a:miter lim="800000"/>
-        </a:ln>
-        <a:effectLst/>
-      </dsp:spPr>
-      <dsp:style>
-        <a:lnRef idx="2">
-          <a:scrgbClr r="0" g="0" b="0"/>
-        </a:lnRef>
-        <a:fillRef idx="1">
-          <a:scrgbClr r="0" g="0" b="0"/>
-        </a:fillRef>
-        <a:effectRef idx="0">
-          <a:scrgbClr r="0" g="0" b="0"/>
-        </a:effectRef>
-        <a:fontRef idx="minor">
-          <a:schemeClr val="lt1"/>
-        </a:fontRef>
-      </dsp:style>
-    </dsp:sp>
-    <dsp:sp modelId="{8F7A122F-A032-49E6-AAC7-9B138367453A}">
-      <dsp:nvSpPr>
-        <dsp:cNvPr id="0" name=""/>
-        <dsp:cNvSpPr/>
-      </dsp:nvSpPr>
-      <dsp:spPr>
-        <a:xfrm>
-          <a:off x="2542565" y="3315719"/>
-          <a:ext cx="912040" cy="1035618"/>
-        </a:xfrm>
-        <a:prstGeom prst="rect">
-          <a:avLst/>
-        </a:prstGeom>
-        <a:noFill/>
-        <a:ln>
-          <a:noFill/>
-        </a:ln>
-        <a:effectLst/>
-      </dsp:spPr>
-      <dsp:style>
-        <a:lnRef idx="0">
-          <a:scrgbClr r="0" g="0" b="0"/>
-        </a:lnRef>
-        <a:fillRef idx="0">
-          <a:scrgbClr r="0" g="0" b="0"/>
-        </a:fillRef>
-        <a:effectRef idx="0">
-          <a:scrgbClr r="0" g="0" b="0"/>
-        </a:effectRef>
-        <a:fontRef idx="minor"/>
-      </dsp:style>
-      <dsp:txBody>
-        <a:bodyPr spcFirstLastPara="0" vert="horz" wrap="square" lIns="84849" tIns="0" rIns="0" bIns="0" numCol="1" spcCol="1270" anchor="t" anchorCtr="0">
-          <a:noAutofit/>
-        </a:bodyPr>
-        <a:lstStyle/>
-        <a:p>
-          <a:pPr lvl="0" algn="l" defTabSz="577850">
-            <a:lnSpc>
-              <a:spcPct val="90000"/>
-            </a:lnSpc>
-            <a:spcBef>
-              <a:spcPct val="0"/>
-            </a:spcBef>
-            <a:spcAft>
-              <a:spcPct val="35000"/>
-            </a:spcAft>
-          </a:pPr>
-          <a:r>
-            <a:rPr lang="de-DE" sz="1300" kern="1200" dirty="0"/>
-            <a:t>Design</a:t>
-          </a:r>
-        </a:p>
-        <a:p>
-          <a:pPr marL="57150" lvl="1" indent="-57150" algn="l" defTabSz="444500">
-            <a:lnSpc>
-              <a:spcPct val="90000"/>
-            </a:lnSpc>
-            <a:spcBef>
-              <a:spcPct val="0"/>
-            </a:spcBef>
-            <a:spcAft>
-              <a:spcPct val="15000"/>
-            </a:spcAft>
-            <a:buChar char="••"/>
-          </a:pPr>
-          <a:r>
-            <a:rPr lang="de-DE" sz="1000" kern="1200" dirty="0"/>
-            <a:t>CSS (100%)</a:t>
-          </a:r>
-        </a:p>
-        <a:p>
-          <a:pPr marL="57150" lvl="1" indent="-57150" algn="l" defTabSz="444500">
-            <a:lnSpc>
-              <a:spcPct val="90000"/>
-            </a:lnSpc>
-            <a:spcBef>
-              <a:spcPct val="0"/>
-            </a:spcBef>
-            <a:spcAft>
-              <a:spcPct val="15000"/>
-            </a:spcAft>
-            <a:buChar char="••"/>
-          </a:pPr>
-          <a:r>
-            <a:rPr lang="de-DE" sz="1000" kern="1200" dirty="0"/>
-            <a:t>HTML (100%)</a:t>
-          </a:r>
-        </a:p>
-        <a:p>
-          <a:pPr marL="57150" lvl="1" indent="-57150" algn="l" defTabSz="444500">
-            <a:lnSpc>
-              <a:spcPct val="90000"/>
-            </a:lnSpc>
-            <a:spcBef>
-              <a:spcPct val="0"/>
-            </a:spcBef>
-            <a:spcAft>
-              <a:spcPct val="15000"/>
-            </a:spcAft>
-            <a:buChar char="••"/>
-          </a:pPr>
-          <a:r>
-            <a:rPr lang="de-DE" sz="1000" kern="1200" dirty="0" err="1"/>
-            <a:t>Materialize</a:t>
-          </a:r>
-          <a:r>
-            <a:rPr lang="de-DE" sz="1000" kern="1200" dirty="0"/>
-            <a:t> (100%)</a:t>
-          </a:r>
-        </a:p>
-      </dsp:txBody>
-      <dsp:txXfrm>
-        <a:off x="2542565" y="3315719"/>
-        <a:ext cx="912040" cy="1035618"/>
-      </dsp:txXfrm>
-    </dsp:sp>
-    <dsp:sp modelId="{727B1B61-B62D-4C3D-B777-43906ADD803C}">
-      <dsp:nvSpPr>
-        <dsp:cNvPr id="0" name=""/>
-        <dsp:cNvSpPr/>
-      </dsp:nvSpPr>
-      <dsp:spPr>
-        <a:xfrm>
-          <a:off x="3329286" y="2402808"/>
-          <a:ext cx="250637" cy="250637"/>
-        </a:xfrm>
-        <a:prstGeom prst="ellipse">
-          <a:avLst/>
-        </a:prstGeom>
-        <a:solidFill>
-          <a:schemeClr val="accent1">
-            <a:hueOff val="0"/>
-            <a:satOff val="0"/>
-            <a:lumOff val="0"/>
-            <a:alphaOff val="0"/>
-          </a:schemeClr>
-        </a:solidFill>
-        <a:ln w="12700" cap="flat" cmpd="sng" algn="ctr">
-          <a:solidFill>
-            <a:schemeClr val="lt1">
-              <a:hueOff val="0"/>
-              <a:satOff val="0"/>
-              <a:lumOff val="0"/>
-              <a:alphaOff val="0"/>
-            </a:schemeClr>
-          </a:solidFill>
-          <a:prstDash val="solid"/>
-          <a:miter lim="800000"/>
-        </a:ln>
-        <a:effectLst/>
-      </dsp:spPr>
-      <dsp:style>
-        <a:lnRef idx="2">
-          <a:scrgbClr r="0" g="0" b="0"/>
-        </a:lnRef>
-        <a:fillRef idx="1">
-          <a:scrgbClr r="0" g="0" b="0"/>
-        </a:fillRef>
-        <a:effectRef idx="0">
-          <a:scrgbClr r="0" g="0" b="0"/>
-        </a:effectRef>
-        <a:fontRef idx="minor">
-          <a:schemeClr val="lt1"/>
-        </a:fontRef>
-      </dsp:style>
-    </dsp:sp>
-    <dsp:sp modelId="{AF8BEF4C-96F3-4ED8-9151-49EE720FCD95}">
-      <dsp:nvSpPr>
-        <dsp:cNvPr id="0" name=""/>
-        <dsp:cNvSpPr/>
-      </dsp:nvSpPr>
-      <dsp:spPr>
-        <a:xfrm>
-          <a:off x="3454605" y="2528127"/>
-          <a:ext cx="1155715" cy="1823210"/>
-        </a:xfrm>
-        <a:prstGeom prst="rect">
-          <a:avLst/>
-        </a:prstGeom>
-        <a:noFill/>
-        <a:ln>
-          <a:noFill/>
-        </a:ln>
-        <a:effectLst/>
-      </dsp:spPr>
-      <dsp:style>
-        <a:lnRef idx="0">
-          <a:scrgbClr r="0" g="0" b="0"/>
-        </a:lnRef>
-        <a:fillRef idx="0">
-          <a:scrgbClr r="0" g="0" b="0"/>
-        </a:fillRef>
-        <a:effectRef idx="0">
-          <a:scrgbClr r="0" g="0" b="0"/>
-        </a:effectRef>
-        <a:fontRef idx="minor"/>
-      </dsp:style>
-      <dsp:txBody>
-        <a:bodyPr spcFirstLastPara="0" vert="horz" wrap="square" lIns="132807" tIns="0" rIns="0" bIns="0" numCol="1" spcCol="1270" anchor="t" anchorCtr="0">
-          <a:noAutofit/>
-        </a:bodyPr>
-        <a:lstStyle/>
-        <a:p>
-          <a:pPr lvl="0" algn="l" defTabSz="577850">
-            <a:lnSpc>
-              <a:spcPct val="90000"/>
-            </a:lnSpc>
-            <a:spcBef>
-              <a:spcPct val="0"/>
-            </a:spcBef>
-            <a:spcAft>
-              <a:spcPct val="35000"/>
-            </a:spcAft>
-          </a:pPr>
-          <a:r>
-            <a:rPr lang="de-DE" sz="1300" kern="1200" dirty="0"/>
-            <a:t>Datenbank</a:t>
-          </a:r>
-        </a:p>
-        <a:p>
-          <a:pPr marL="57150" lvl="1" indent="-57150" algn="l" defTabSz="444500">
-            <a:lnSpc>
-              <a:spcPct val="90000"/>
-            </a:lnSpc>
-            <a:spcBef>
-              <a:spcPct val="0"/>
-            </a:spcBef>
-            <a:spcAft>
-              <a:spcPct val="15000"/>
-            </a:spcAft>
-            <a:buChar char="••"/>
-          </a:pPr>
-          <a:r>
-            <a:rPr lang="de-DE" sz="1000" kern="1200" dirty="0"/>
-            <a:t>ERM (100%)</a:t>
-          </a:r>
-        </a:p>
-        <a:p>
-          <a:pPr marL="57150" lvl="1" indent="-57150" algn="l" defTabSz="444500">
-            <a:lnSpc>
-              <a:spcPct val="90000"/>
-            </a:lnSpc>
-            <a:spcBef>
-              <a:spcPct val="0"/>
-            </a:spcBef>
-            <a:spcAft>
-              <a:spcPct val="15000"/>
-            </a:spcAft>
-            <a:buChar char="••"/>
-          </a:pPr>
-          <a:r>
-            <a:rPr lang="de-DE" sz="1000" kern="1200" dirty="0"/>
-            <a:t>SQL (100%)</a:t>
-          </a:r>
-        </a:p>
-      </dsp:txBody>
-      <dsp:txXfrm>
-        <a:off x="3454605" y="2528127"/>
-        <a:ext cx="1155715" cy="1823210"/>
-      </dsp:txXfrm>
-    </dsp:sp>
-    <dsp:sp modelId="{002C3FB9-310D-4961-BDD5-1DFD86FE10F5}">
-      <dsp:nvSpPr>
-        <dsp:cNvPr id="0" name=""/>
-        <dsp:cNvSpPr/>
-      </dsp:nvSpPr>
-      <dsp:spPr>
-        <a:xfrm>
-          <a:off x="4443229" y="1738794"/>
-          <a:ext cx="334182" cy="334182"/>
-        </a:xfrm>
-        <a:prstGeom prst="ellipse">
-          <a:avLst/>
-        </a:prstGeom>
-        <a:solidFill>
-          <a:schemeClr val="accent1">
-            <a:hueOff val="0"/>
-            <a:satOff val="0"/>
-            <a:lumOff val="0"/>
-            <a:alphaOff val="0"/>
-          </a:schemeClr>
-        </a:solidFill>
-        <a:ln w="12700" cap="flat" cmpd="sng" algn="ctr">
-          <a:solidFill>
-            <a:schemeClr val="lt1">
-              <a:hueOff val="0"/>
-              <a:satOff val="0"/>
-              <a:lumOff val="0"/>
-              <a:alphaOff val="0"/>
-            </a:schemeClr>
-          </a:solidFill>
-          <a:prstDash val="solid"/>
-          <a:miter lim="800000"/>
-        </a:ln>
-        <a:effectLst/>
-      </dsp:spPr>
-      <dsp:style>
-        <a:lnRef idx="2">
-          <a:scrgbClr r="0" g="0" b="0"/>
-        </a:lnRef>
-        <a:fillRef idx="1">
-          <a:scrgbClr r="0" g="0" b="0"/>
-        </a:fillRef>
-        <a:effectRef idx="0">
-          <a:scrgbClr r="0" g="0" b="0"/>
-        </a:effectRef>
-        <a:fontRef idx="minor">
-          <a:schemeClr val="lt1"/>
-        </a:fontRef>
-      </dsp:style>
-    </dsp:sp>
-    <dsp:sp modelId="{55D03CFC-8164-4FA7-8D3A-0BF5D70844C3}">
-      <dsp:nvSpPr>
-        <dsp:cNvPr id="0" name=""/>
-        <dsp:cNvSpPr/>
-      </dsp:nvSpPr>
-      <dsp:spPr>
-        <a:xfrm>
-          <a:off x="4610320" y="1905886"/>
-          <a:ext cx="1343693" cy="2445451"/>
-        </a:xfrm>
-        <a:prstGeom prst="rect">
-          <a:avLst/>
-        </a:prstGeom>
-        <a:noFill/>
-        <a:ln>
-          <a:noFill/>
-        </a:ln>
-        <a:effectLst/>
-      </dsp:spPr>
-      <dsp:style>
-        <a:lnRef idx="0">
-          <a:scrgbClr r="0" g="0" b="0"/>
-        </a:lnRef>
-        <a:fillRef idx="0">
-          <a:scrgbClr r="0" g="0" b="0"/>
-        </a:fillRef>
-        <a:effectRef idx="0">
-          <a:scrgbClr r="0" g="0" b="0"/>
-        </a:effectRef>
-        <a:fontRef idx="minor"/>
-      </dsp:style>
-      <dsp:txBody>
-        <a:bodyPr spcFirstLastPara="0" vert="horz" wrap="square" lIns="177077" tIns="0" rIns="0" bIns="0" numCol="1" spcCol="1270" anchor="t" anchorCtr="0">
-          <a:noAutofit/>
-        </a:bodyPr>
-        <a:lstStyle/>
-        <a:p>
-          <a:pPr lvl="0" algn="l" defTabSz="577850">
-            <a:lnSpc>
-              <a:spcPct val="90000"/>
-            </a:lnSpc>
-            <a:spcBef>
-              <a:spcPct val="0"/>
-            </a:spcBef>
-            <a:spcAft>
-              <a:spcPct val="35000"/>
-            </a:spcAft>
-          </a:pPr>
-          <a:r>
-            <a:rPr lang="de-DE" sz="1300" kern="1200" dirty="0"/>
-            <a:t>Logik</a:t>
-          </a:r>
-        </a:p>
-        <a:p>
-          <a:pPr marL="57150" lvl="1" indent="-57150" algn="l" defTabSz="444500">
-            <a:lnSpc>
-              <a:spcPct val="90000"/>
-            </a:lnSpc>
-            <a:spcBef>
-              <a:spcPct val="0"/>
-            </a:spcBef>
-            <a:spcAft>
-              <a:spcPct val="15000"/>
-            </a:spcAft>
-            <a:buChar char="••"/>
-          </a:pPr>
-          <a:r>
-            <a:rPr lang="de-DE" sz="1000" kern="1200" dirty="0"/>
-            <a:t>Mathematische Ansätze (50%)</a:t>
-          </a:r>
-        </a:p>
-        <a:p>
-          <a:pPr marL="57150" lvl="1" indent="-57150" algn="l" defTabSz="444500">
-            <a:lnSpc>
-              <a:spcPct val="90000"/>
-            </a:lnSpc>
-            <a:spcBef>
-              <a:spcPct val="0"/>
-            </a:spcBef>
-            <a:spcAft>
-              <a:spcPct val="15000"/>
-            </a:spcAft>
-            <a:buChar char="••"/>
-          </a:pPr>
-          <a:r>
-            <a:rPr lang="de-DE" sz="1000" kern="1200" dirty="0"/>
-            <a:t>Visualisierung der Logik (80%)</a:t>
-          </a:r>
-        </a:p>
-        <a:p>
-          <a:pPr marL="57150" lvl="1" indent="-57150" algn="l" defTabSz="444500">
-            <a:lnSpc>
-              <a:spcPct val="90000"/>
-            </a:lnSpc>
-            <a:spcBef>
-              <a:spcPct val="0"/>
-            </a:spcBef>
-            <a:spcAft>
-              <a:spcPct val="15000"/>
-            </a:spcAft>
-            <a:buChar char="••"/>
-          </a:pPr>
-          <a:r>
-            <a:rPr lang="de-DE" sz="1000" kern="1200" dirty="0"/>
-            <a:t>Umsetzung der Logik (80%)</a:t>
-          </a:r>
-        </a:p>
-      </dsp:txBody>
-      <dsp:txXfrm>
-        <a:off x="4610320" y="1905886"/>
-        <a:ext cx="1343693" cy="2445451"/>
-      </dsp:txXfrm>
-    </dsp:sp>
-    <dsp:sp modelId="{E1CCDBEE-AB6F-4355-994F-2E8E439F6159}">
-      <dsp:nvSpPr>
-        <dsp:cNvPr id="0" name=""/>
-        <dsp:cNvSpPr/>
-      </dsp:nvSpPr>
-      <dsp:spPr>
-        <a:xfrm>
-          <a:off x="5738187" y="1220115"/>
-          <a:ext cx="431652" cy="431652"/>
-        </a:xfrm>
-        <a:prstGeom prst="ellipse">
-          <a:avLst/>
-        </a:prstGeom>
-        <a:solidFill>
-          <a:schemeClr val="accent1">
-            <a:hueOff val="0"/>
-            <a:satOff val="0"/>
-            <a:lumOff val="0"/>
-            <a:alphaOff val="0"/>
-          </a:schemeClr>
-        </a:solidFill>
-        <a:ln w="12700" cap="flat" cmpd="sng" algn="ctr">
-          <a:solidFill>
-            <a:schemeClr val="lt1">
-              <a:hueOff val="0"/>
-              <a:satOff val="0"/>
-              <a:lumOff val="0"/>
-              <a:alphaOff val="0"/>
-            </a:schemeClr>
-          </a:solidFill>
-          <a:prstDash val="solid"/>
-          <a:miter lim="800000"/>
-        </a:ln>
-        <a:effectLst/>
-      </dsp:spPr>
-      <dsp:style>
-        <a:lnRef idx="2">
-          <a:scrgbClr r="0" g="0" b="0"/>
-        </a:lnRef>
-        <a:fillRef idx="1">
-          <a:scrgbClr r="0" g="0" b="0"/>
-        </a:fillRef>
-        <a:effectRef idx="0">
-          <a:scrgbClr r="0" g="0" b="0"/>
-        </a:effectRef>
-        <a:fontRef idx="minor">
-          <a:schemeClr val="lt1"/>
-        </a:fontRef>
-      </dsp:style>
-    </dsp:sp>
-    <dsp:sp modelId="{39A9EDD7-064B-4D2E-A8C1-EDF39C82A076}">
-      <dsp:nvSpPr>
-        <dsp:cNvPr id="0" name=""/>
-        <dsp:cNvSpPr/>
-      </dsp:nvSpPr>
-      <dsp:spPr>
-        <a:xfrm>
-          <a:off x="5954014" y="1435941"/>
-          <a:ext cx="1392428" cy="2915396"/>
-        </a:xfrm>
-        <a:prstGeom prst="rect">
-          <a:avLst/>
-        </a:prstGeom>
-        <a:noFill/>
-        <a:ln>
-          <a:noFill/>
-        </a:ln>
-        <a:effectLst/>
-      </dsp:spPr>
-      <dsp:style>
-        <a:lnRef idx="0">
-          <a:scrgbClr r="0" g="0" b="0"/>
-        </a:lnRef>
-        <a:fillRef idx="0">
-          <a:scrgbClr r="0" g="0" b="0"/>
-        </a:fillRef>
-        <a:effectRef idx="0">
-          <a:scrgbClr r="0" g="0" b="0"/>
-        </a:effectRef>
-        <a:fontRef idx="minor"/>
-      </dsp:style>
-      <dsp:txBody>
-        <a:bodyPr spcFirstLastPara="0" vert="horz" wrap="square" lIns="228724" tIns="0" rIns="0" bIns="0" numCol="1" spcCol="1270" anchor="t" anchorCtr="0">
-          <a:noAutofit/>
-        </a:bodyPr>
-        <a:lstStyle/>
-        <a:p>
-          <a:pPr lvl="0" algn="l" defTabSz="577850">
-            <a:lnSpc>
-              <a:spcPct val="90000"/>
-            </a:lnSpc>
-            <a:spcBef>
-              <a:spcPct val="0"/>
-            </a:spcBef>
-            <a:spcAft>
-              <a:spcPct val="35000"/>
-            </a:spcAft>
-          </a:pPr>
-          <a:r>
-            <a:rPr lang="de-DE" sz="1300" kern="1200" dirty="0"/>
-            <a:t>Backend</a:t>
-          </a:r>
-        </a:p>
-        <a:p>
-          <a:pPr marL="57150" lvl="1" indent="-57150" algn="l" defTabSz="444500">
-            <a:lnSpc>
-              <a:spcPct val="90000"/>
-            </a:lnSpc>
-            <a:spcBef>
-              <a:spcPct val="0"/>
-            </a:spcBef>
-            <a:spcAft>
-              <a:spcPct val="15000"/>
-            </a:spcAft>
-            <a:buChar char="••"/>
-          </a:pPr>
-          <a:r>
-            <a:rPr lang="de-DE" sz="1000" kern="1200" dirty="0"/>
-            <a:t>PHP (100%)</a:t>
-          </a:r>
-        </a:p>
-      </dsp:txBody>
-      <dsp:txXfrm>
-        <a:off x="5954014" y="1435941"/>
-        <a:ext cx="1392428" cy="2915396"/>
-      </dsp:txXfrm>
-    </dsp:sp>
-    <dsp:sp modelId="{68B7B68E-B8B8-4EC2-A2FF-28B45B958F5A}">
-      <dsp:nvSpPr>
-        <dsp:cNvPr id="0" name=""/>
-        <dsp:cNvSpPr/>
-      </dsp:nvSpPr>
-      <dsp:spPr>
-        <a:xfrm>
-          <a:off x="7071437" y="873748"/>
-          <a:ext cx="550009" cy="550009"/>
-        </a:xfrm>
-        <a:prstGeom prst="ellipse">
-          <a:avLst/>
-        </a:prstGeom>
-        <a:solidFill>
-          <a:schemeClr val="accent1">
-            <a:hueOff val="0"/>
-            <a:satOff val="0"/>
-            <a:lumOff val="0"/>
-            <a:alphaOff val="0"/>
-          </a:schemeClr>
-        </a:solidFill>
-        <a:ln w="12700" cap="flat" cmpd="sng" algn="ctr">
-          <a:solidFill>
-            <a:schemeClr val="lt1">
-              <a:hueOff val="0"/>
-              <a:satOff val="0"/>
-              <a:lumOff val="0"/>
-              <a:alphaOff val="0"/>
-            </a:schemeClr>
-          </a:solidFill>
-          <a:prstDash val="solid"/>
-          <a:miter lim="800000"/>
-        </a:ln>
-        <a:effectLst/>
-      </dsp:spPr>
-      <dsp:style>
-        <a:lnRef idx="2">
-          <a:scrgbClr r="0" g="0" b="0"/>
-        </a:lnRef>
-        <a:fillRef idx="1">
-          <a:scrgbClr r="0" g="0" b="0"/>
-        </a:fillRef>
-        <a:effectRef idx="0">
-          <a:scrgbClr r="0" g="0" b="0"/>
-        </a:effectRef>
-        <a:fontRef idx="minor">
-          <a:schemeClr val="lt1"/>
-        </a:fontRef>
-      </dsp:style>
-    </dsp:sp>
-    <dsp:sp modelId="{1C4F9093-FE47-4554-A822-B92A4C0EC2A7}">
-      <dsp:nvSpPr>
-        <dsp:cNvPr id="0" name=""/>
-        <dsp:cNvSpPr/>
-      </dsp:nvSpPr>
-      <dsp:spPr>
-        <a:xfrm>
-          <a:off x="7346442" y="1148753"/>
-          <a:ext cx="1392428" cy="3202584"/>
-        </a:xfrm>
-        <a:prstGeom prst="rect">
-          <a:avLst/>
-        </a:prstGeom>
-        <a:noFill/>
-        <a:ln>
-          <a:noFill/>
-        </a:ln>
-        <a:effectLst/>
-      </dsp:spPr>
-      <dsp:style>
-        <a:lnRef idx="0">
-          <a:scrgbClr r="0" g="0" b="0"/>
-        </a:lnRef>
-        <a:fillRef idx="0">
-          <a:scrgbClr r="0" g="0" b="0"/>
-        </a:fillRef>
-        <a:effectRef idx="0">
-          <a:scrgbClr r="0" g="0" b="0"/>
-        </a:effectRef>
-        <a:fontRef idx="minor"/>
-      </dsp:style>
-      <dsp:txBody>
-        <a:bodyPr spcFirstLastPara="0" vert="horz" wrap="square" lIns="291438" tIns="0" rIns="0" bIns="0" numCol="1" spcCol="1270" anchor="t" anchorCtr="0">
-          <a:noAutofit/>
-        </a:bodyPr>
-        <a:lstStyle/>
-        <a:p>
-          <a:pPr lvl="0" algn="l" defTabSz="577850">
-            <a:lnSpc>
-              <a:spcPct val="90000"/>
-            </a:lnSpc>
-            <a:spcBef>
-              <a:spcPct val="0"/>
-            </a:spcBef>
-            <a:spcAft>
-              <a:spcPct val="35000"/>
-            </a:spcAft>
-          </a:pPr>
-          <a:r>
-            <a:rPr lang="de-DE" sz="1300" kern="1200" dirty="0"/>
-            <a:t>Frontend</a:t>
-          </a:r>
-        </a:p>
-        <a:p>
-          <a:pPr marL="57150" lvl="1" indent="-57150" algn="l" defTabSz="444500">
-            <a:lnSpc>
-              <a:spcPct val="90000"/>
-            </a:lnSpc>
-            <a:spcBef>
-              <a:spcPct val="0"/>
-            </a:spcBef>
-            <a:spcAft>
-              <a:spcPct val="15000"/>
-            </a:spcAft>
-            <a:buChar char="••"/>
-          </a:pPr>
-          <a:r>
-            <a:rPr lang="de-DE" sz="1000" kern="1200" dirty="0"/>
-            <a:t>JS (100%)</a:t>
-          </a:r>
-        </a:p>
-      </dsp:txBody>
-      <dsp:txXfrm>
-        <a:off x="7346442" y="1148753"/>
-        <a:ext cx="1392428" cy="3202584"/>
-      </dsp:txXfrm>
-    </dsp:sp>
   </dsp:spTree>
 </dsp:drawing>
 </file>
@@ -6065,1019 +5322,6 @@
       <dsp:cNvGrpSpPr/>
     </dsp:nvGrpSpPr>
     <dsp:grpSpPr/>
-    <dsp:sp modelId="{CA0371F2-4905-4094-9792-0F4EC6527AB6}">
-      <dsp:nvSpPr>
-        <dsp:cNvPr id="0" name=""/>
-        <dsp:cNvSpPr/>
-      </dsp:nvSpPr>
-      <dsp:spPr>
-        <a:xfrm>
-          <a:off x="5157251" y="1817035"/>
-          <a:ext cx="4046947" cy="601579"/>
-        </a:xfrm>
-        <a:custGeom>
-          <a:avLst/>
-          <a:gdLst/>
-          <a:ahLst/>
-          <a:cxnLst/>
-          <a:rect l="0" t="0" r="0" b="0"/>
-          <a:pathLst>
-            <a:path>
-              <a:moveTo>
-                <a:pt x="0" y="0"/>
-              </a:moveTo>
-              <a:lnTo>
-                <a:pt x="0" y="358633"/>
-              </a:lnTo>
-              <a:lnTo>
-                <a:pt x="4046947" y="358633"/>
-              </a:lnTo>
-              <a:lnTo>
-                <a:pt x="4046947" y="601579"/>
-              </a:lnTo>
-            </a:path>
-          </a:pathLst>
-        </a:custGeom>
-        <a:noFill/>
-        <a:ln w="12700" cap="flat" cmpd="sng" algn="ctr">
-          <a:solidFill>
-            <a:schemeClr val="accent1">
-              <a:shade val="60000"/>
-              <a:hueOff val="0"/>
-              <a:satOff val="0"/>
-              <a:lumOff val="0"/>
-              <a:alphaOff val="0"/>
-            </a:schemeClr>
-          </a:solidFill>
-          <a:prstDash val="solid"/>
-          <a:miter lim="800000"/>
-        </a:ln>
-        <a:effectLst/>
-      </dsp:spPr>
-      <dsp:style>
-        <a:lnRef idx="2">
-          <a:scrgbClr r="0" g="0" b="0"/>
-        </a:lnRef>
-        <a:fillRef idx="0">
-          <a:scrgbClr r="0" g="0" b="0"/>
-        </a:fillRef>
-        <a:effectRef idx="0">
-          <a:scrgbClr r="0" g="0" b="0"/>
-        </a:effectRef>
-        <a:fontRef idx="minor"/>
-      </dsp:style>
-    </dsp:sp>
-    <dsp:sp modelId="{EC9CC648-36AF-46A2-8311-685C7A41B586}">
-      <dsp:nvSpPr>
-        <dsp:cNvPr id="0" name=""/>
-        <dsp:cNvSpPr/>
-      </dsp:nvSpPr>
-      <dsp:spPr>
-        <a:xfrm>
-          <a:off x="5157251" y="1817035"/>
-          <a:ext cx="1348982" cy="601579"/>
-        </a:xfrm>
-        <a:custGeom>
-          <a:avLst/>
-          <a:gdLst/>
-          <a:ahLst/>
-          <a:cxnLst/>
-          <a:rect l="0" t="0" r="0" b="0"/>
-          <a:pathLst>
-            <a:path>
-              <a:moveTo>
-                <a:pt x="0" y="0"/>
-              </a:moveTo>
-              <a:lnTo>
-                <a:pt x="0" y="358633"/>
-              </a:lnTo>
-              <a:lnTo>
-                <a:pt x="1348982" y="358633"/>
-              </a:lnTo>
-              <a:lnTo>
-                <a:pt x="1348982" y="601579"/>
-              </a:lnTo>
-            </a:path>
-          </a:pathLst>
-        </a:custGeom>
-        <a:noFill/>
-        <a:ln w="12700" cap="flat" cmpd="sng" algn="ctr">
-          <a:solidFill>
-            <a:schemeClr val="accent1">
-              <a:shade val="60000"/>
-              <a:hueOff val="0"/>
-              <a:satOff val="0"/>
-              <a:lumOff val="0"/>
-              <a:alphaOff val="0"/>
-            </a:schemeClr>
-          </a:solidFill>
-          <a:prstDash val="solid"/>
-          <a:miter lim="800000"/>
-        </a:ln>
-        <a:effectLst/>
-      </dsp:spPr>
-      <dsp:style>
-        <a:lnRef idx="2">
-          <a:scrgbClr r="0" g="0" b="0"/>
-        </a:lnRef>
-        <a:fillRef idx="0">
-          <a:scrgbClr r="0" g="0" b="0"/>
-        </a:fillRef>
-        <a:effectRef idx="0">
-          <a:scrgbClr r="0" g="0" b="0"/>
-        </a:effectRef>
-        <a:fontRef idx="minor"/>
-      </dsp:style>
-    </dsp:sp>
-    <dsp:sp modelId="{418B8B31-D631-4C74-B418-D94A89EA2477}">
-      <dsp:nvSpPr>
-        <dsp:cNvPr id="0" name=""/>
-        <dsp:cNvSpPr/>
-      </dsp:nvSpPr>
-      <dsp:spPr>
-        <a:xfrm>
-          <a:off x="3808268" y="1817035"/>
-          <a:ext cx="1348982" cy="601579"/>
-        </a:xfrm>
-        <a:custGeom>
-          <a:avLst/>
-          <a:gdLst/>
-          <a:ahLst/>
-          <a:cxnLst/>
-          <a:rect l="0" t="0" r="0" b="0"/>
-          <a:pathLst>
-            <a:path>
-              <a:moveTo>
-                <a:pt x="1348982" y="0"/>
-              </a:moveTo>
-              <a:lnTo>
-                <a:pt x="1348982" y="358633"/>
-              </a:lnTo>
-              <a:lnTo>
-                <a:pt x="0" y="358633"/>
-              </a:lnTo>
-              <a:lnTo>
-                <a:pt x="0" y="601579"/>
-              </a:lnTo>
-            </a:path>
-          </a:pathLst>
-        </a:custGeom>
-        <a:noFill/>
-        <a:ln w="12700" cap="flat" cmpd="sng" algn="ctr">
-          <a:solidFill>
-            <a:schemeClr val="accent1">
-              <a:shade val="60000"/>
-              <a:hueOff val="0"/>
-              <a:satOff val="0"/>
-              <a:lumOff val="0"/>
-              <a:alphaOff val="0"/>
-            </a:schemeClr>
-          </a:solidFill>
-          <a:prstDash val="solid"/>
-          <a:miter lim="800000"/>
-        </a:ln>
-        <a:effectLst/>
-      </dsp:spPr>
-      <dsp:style>
-        <a:lnRef idx="2">
-          <a:scrgbClr r="0" g="0" b="0"/>
-        </a:lnRef>
-        <a:fillRef idx="0">
-          <a:scrgbClr r="0" g="0" b="0"/>
-        </a:fillRef>
-        <a:effectRef idx="0">
-          <a:scrgbClr r="0" g="0" b="0"/>
-        </a:effectRef>
-        <a:fontRef idx="minor"/>
-      </dsp:style>
-    </dsp:sp>
-    <dsp:sp modelId="{D5F6D8B8-4258-4198-BE70-A80B84977E1D}">
-      <dsp:nvSpPr>
-        <dsp:cNvPr id="0" name=""/>
-        <dsp:cNvSpPr/>
-      </dsp:nvSpPr>
-      <dsp:spPr>
-        <a:xfrm>
-          <a:off x="1110303" y="1817035"/>
-          <a:ext cx="4046947" cy="601579"/>
-        </a:xfrm>
-        <a:custGeom>
-          <a:avLst/>
-          <a:gdLst/>
-          <a:ahLst/>
-          <a:cxnLst/>
-          <a:rect l="0" t="0" r="0" b="0"/>
-          <a:pathLst>
-            <a:path>
-              <a:moveTo>
-                <a:pt x="4046947" y="0"/>
-              </a:moveTo>
-              <a:lnTo>
-                <a:pt x="4046947" y="358633"/>
-              </a:lnTo>
-              <a:lnTo>
-                <a:pt x="0" y="358633"/>
-              </a:lnTo>
-              <a:lnTo>
-                <a:pt x="0" y="601579"/>
-              </a:lnTo>
-            </a:path>
-          </a:pathLst>
-        </a:custGeom>
-        <a:noFill/>
-        <a:ln w="12700" cap="flat" cmpd="sng" algn="ctr">
-          <a:solidFill>
-            <a:schemeClr val="accent1">
-              <a:shade val="60000"/>
-              <a:hueOff val="0"/>
-              <a:satOff val="0"/>
-              <a:lumOff val="0"/>
-              <a:alphaOff val="0"/>
-            </a:schemeClr>
-          </a:solidFill>
-          <a:prstDash val="solid"/>
-          <a:miter lim="800000"/>
-        </a:ln>
-        <a:effectLst/>
-      </dsp:spPr>
-      <dsp:style>
-        <a:lnRef idx="2">
-          <a:scrgbClr r="0" g="0" b="0"/>
-        </a:lnRef>
-        <a:fillRef idx="0">
-          <a:scrgbClr r="0" g="0" b="0"/>
-        </a:fillRef>
-        <a:effectRef idx="0">
-          <a:scrgbClr r="0" g="0" b="0"/>
-        </a:effectRef>
-        <a:fontRef idx="minor"/>
-      </dsp:style>
-    </dsp:sp>
-    <dsp:sp modelId="{C61E91A9-AF0A-4AA8-B087-498BC119B802}">
-      <dsp:nvSpPr>
-        <dsp:cNvPr id="0" name=""/>
-        <dsp:cNvSpPr/>
-      </dsp:nvSpPr>
-      <dsp:spPr>
-        <a:xfrm>
-          <a:off x="4151762" y="775840"/>
-          <a:ext cx="2010976" cy="1041194"/>
-        </a:xfrm>
-        <a:prstGeom prst="rect">
-          <a:avLst/>
-        </a:prstGeom>
-        <a:solidFill>
-          <a:schemeClr val="accent1">
-            <a:hueOff val="0"/>
-            <a:satOff val="0"/>
-            <a:lumOff val="0"/>
-            <a:alphaOff val="0"/>
-          </a:schemeClr>
-        </a:solidFill>
-        <a:ln w="12700" cap="flat" cmpd="sng" algn="ctr">
-          <a:solidFill>
-            <a:schemeClr val="lt1">
-              <a:hueOff val="0"/>
-              <a:satOff val="0"/>
-              <a:lumOff val="0"/>
-              <a:alphaOff val="0"/>
-            </a:schemeClr>
-          </a:solidFill>
-          <a:prstDash val="solid"/>
-          <a:miter lim="800000"/>
-        </a:ln>
-        <a:effectLst/>
-      </dsp:spPr>
-      <dsp:style>
-        <a:lnRef idx="2">
-          <a:scrgbClr r="0" g="0" b="0"/>
-        </a:lnRef>
-        <a:fillRef idx="1">
-          <a:scrgbClr r="0" g="0" b="0"/>
-        </a:fillRef>
-        <a:effectRef idx="0">
-          <a:scrgbClr r="0" g="0" b="0"/>
-        </a:effectRef>
-        <a:fontRef idx="minor">
-          <a:schemeClr val="lt1"/>
-        </a:fontRef>
-      </dsp:style>
-      <dsp:txBody>
-        <a:bodyPr spcFirstLastPara="0" vert="horz" wrap="square" lIns="12065" tIns="12065" rIns="12065" bIns="146924" numCol="1" spcCol="1270" anchor="ctr" anchorCtr="0">
-          <a:noAutofit/>
-        </a:bodyPr>
-        <a:lstStyle/>
-        <a:p>
-          <a:pPr lvl="0" algn="ctr" defTabSz="844550">
-            <a:lnSpc>
-              <a:spcPct val="90000"/>
-            </a:lnSpc>
-            <a:spcBef>
-              <a:spcPct val="0"/>
-            </a:spcBef>
-            <a:spcAft>
-              <a:spcPct val="35000"/>
-            </a:spcAft>
-          </a:pPr>
-          <a:r>
-            <a:rPr lang="de-DE" sz="1900" kern="1200" dirty="0"/>
-            <a:t>Projektleiter</a:t>
-          </a:r>
-        </a:p>
-      </dsp:txBody>
-      <dsp:txXfrm>
-        <a:off x="4151762" y="775840"/>
-        <a:ext cx="2010976" cy="1041194"/>
-      </dsp:txXfrm>
-    </dsp:sp>
-    <dsp:sp modelId="{F30DCFA2-97CF-4F43-B794-E8837C6096F0}">
-      <dsp:nvSpPr>
-        <dsp:cNvPr id="0" name=""/>
-        <dsp:cNvSpPr/>
-      </dsp:nvSpPr>
-      <dsp:spPr>
-        <a:xfrm>
-          <a:off x="4553958" y="1585658"/>
-          <a:ext cx="1809878" cy="347064"/>
-        </a:xfrm>
-        <a:prstGeom prst="rect">
-          <a:avLst/>
-        </a:prstGeom>
-        <a:solidFill>
-          <a:schemeClr val="lt1">
-            <a:alpha val="90000"/>
-            <a:hueOff val="0"/>
-            <a:satOff val="0"/>
-            <a:lumOff val="0"/>
-            <a:alphaOff val="0"/>
-          </a:schemeClr>
-        </a:solidFill>
-        <a:ln w="12700" cap="flat" cmpd="sng" algn="ctr">
-          <a:solidFill>
-            <a:schemeClr val="accent1">
-              <a:hueOff val="0"/>
-              <a:satOff val="0"/>
-              <a:lumOff val="0"/>
-              <a:alphaOff val="0"/>
-            </a:schemeClr>
-          </a:solidFill>
-          <a:prstDash val="solid"/>
-          <a:miter lim="800000"/>
-        </a:ln>
-        <a:effectLst/>
-      </dsp:spPr>
-      <dsp:style>
-        <a:lnRef idx="2">
-          <a:scrgbClr r="0" g="0" b="0"/>
-        </a:lnRef>
-        <a:fillRef idx="1">
-          <a:scrgbClr r="0" g="0" b="0"/>
-        </a:fillRef>
-        <a:effectRef idx="0">
-          <a:scrgbClr r="0" g="0" b="0"/>
-        </a:effectRef>
-        <a:fontRef idx="minor"/>
-      </dsp:style>
-      <dsp:txBody>
-        <a:bodyPr spcFirstLastPara="0" vert="horz" wrap="square" lIns="38100" tIns="9525" rIns="38100" bIns="9525" numCol="1" spcCol="1270" anchor="ctr" anchorCtr="0">
-          <a:noAutofit/>
-        </a:bodyPr>
-        <a:lstStyle/>
-        <a:p>
-          <a:pPr lvl="0" algn="r" defTabSz="666750">
-            <a:lnSpc>
-              <a:spcPct val="90000"/>
-            </a:lnSpc>
-            <a:spcBef>
-              <a:spcPct val="0"/>
-            </a:spcBef>
-            <a:spcAft>
-              <a:spcPct val="35000"/>
-            </a:spcAft>
-          </a:pPr>
-          <a:r>
-            <a:rPr lang="de-DE" sz="1500" kern="1200" dirty="0"/>
-            <a:t>Delegiert Aufgaben an</a:t>
-          </a:r>
-        </a:p>
-      </dsp:txBody>
-      <dsp:txXfrm>
-        <a:off x="4553958" y="1585658"/>
-        <a:ext cx="1809878" cy="347064"/>
-      </dsp:txXfrm>
-    </dsp:sp>
-    <dsp:sp modelId="{F9D5EE5F-B1B3-4107-BE5B-57C9D2EDB3FD}">
-      <dsp:nvSpPr>
-        <dsp:cNvPr id="0" name=""/>
-        <dsp:cNvSpPr/>
-      </dsp:nvSpPr>
-      <dsp:spPr>
-        <a:xfrm>
-          <a:off x="104815" y="2418614"/>
-          <a:ext cx="2010976" cy="1041194"/>
-        </a:xfrm>
-        <a:prstGeom prst="rect">
-          <a:avLst/>
-        </a:prstGeom>
-        <a:solidFill>
-          <a:schemeClr val="accent1">
-            <a:hueOff val="0"/>
-            <a:satOff val="0"/>
-            <a:lumOff val="0"/>
-            <a:alphaOff val="0"/>
-          </a:schemeClr>
-        </a:solidFill>
-        <a:ln w="12700" cap="flat" cmpd="sng" algn="ctr">
-          <a:solidFill>
-            <a:schemeClr val="lt1">
-              <a:hueOff val="0"/>
-              <a:satOff val="0"/>
-              <a:lumOff val="0"/>
-              <a:alphaOff val="0"/>
-            </a:schemeClr>
-          </a:solidFill>
-          <a:prstDash val="solid"/>
-          <a:miter lim="800000"/>
-        </a:ln>
-        <a:effectLst/>
-      </dsp:spPr>
-      <dsp:style>
-        <a:lnRef idx="2">
-          <a:scrgbClr r="0" g="0" b="0"/>
-        </a:lnRef>
-        <a:fillRef idx="1">
-          <a:scrgbClr r="0" g="0" b="0"/>
-        </a:fillRef>
-        <a:effectRef idx="0">
-          <a:scrgbClr r="0" g="0" b="0"/>
-        </a:effectRef>
-        <a:fontRef idx="minor">
-          <a:schemeClr val="lt1"/>
-        </a:fontRef>
-      </dsp:style>
-      <dsp:txBody>
-        <a:bodyPr spcFirstLastPara="0" vert="horz" wrap="square" lIns="12065" tIns="12065" rIns="12065" bIns="146924" numCol="1" spcCol="1270" anchor="ctr" anchorCtr="0">
-          <a:noAutofit/>
-        </a:bodyPr>
-        <a:lstStyle/>
-        <a:p>
-          <a:pPr lvl="0" algn="ctr" defTabSz="844550">
-            <a:lnSpc>
-              <a:spcPct val="90000"/>
-            </a:lnSpc>
-            <a:spcBef>
-              <a:spcPct val="0"/>
-            </a:spcBef>
-            <a:spcAft>
-              <a:spcPct val="35000"/>
-            </a:spcAft>
-          </a:pPr>
-          <a:r>
-            <a:rPr lang="de-DE" sz="1900" kern="1200" dirty="0"/>
-            <a:t>Projektkoordinator</a:t>
-          </a:r>
-        </a:p>
-      </dsp:txBody>
-      <dsp:txXfrm>
-        <a:off x="104815" y="2418614"/>
-        <a:ext cx="2010976" cy="1041194"/>
-      </dsp:txXfrm>
-    </dsp:sp>
-    <dsp:sp modelId="{970DF215-3A69-44D5-BB4D-176CA6265961}">
-      <dsp:nvSpPr>
-        <dsp:cNvPr id="0" name=""/>
-        <dsp:cNvSpPr/>
-      </dsp:nvSpPr>
-      <dsp:spPr>
-        <a:xfrm>
-          <a:off x="507010" y="3228432"/>
-          <a:ext cx="1809878" cy="347064"/>
-        </a:xfrm>
-        <a:prstGeom prst="rect">
-          <a:avLst/>
-        </a:prstGeom>
-        <a:solidFill>
-          <a:schemeClr val="lt1">
-            <a:alpha val="90000"/>
-            <a:hueOff val="0"/>
-            <a:satOff val="0"/>
-            <a:lumOff val="0"/>
-            <a:alphaOff val="0"/>
-          </a:schemeClr>
-        </a:solidFill>
-        <a:ln w="12700" cap="flat" cmpd="sng" algn="ctr">
-          <a:solidFill>
-            <a:schemeClr val="accent1">
-              <a:hueOff val="0"/>
-              <a:satOff val="0"/>
-              <a:lumOff val="0"/>
-              <a:alphaOff val="0"/>
-            </a:schemeClr>
-          </a:solidFill>
-          <a:prstDash val="solid"/>
-          <a:miter lim="800000"/>
-        </a:ln>
-        <a:effectLst/>
-      </dsp:spPr>
-      <dsp:style>
-        <a:lnRef idx="2">
-          <a:scrgbClr r="0" g="0" b="0"/>
-        </a:lnRef>
-        <a:fillRef idx="1">
-          <a:scrgbClr r="0" g="0" b="0"/>
-        </a:fillRef>
-        <a:effectRef idx="0">
-          <a:scrgbClr r="0" g="0" b="0"/>
-        </a:effectRef>
-        <a:fontRef idx="minor"/>
-      </dsp:style>
-      <dsp:txBody>
-        <a:bodyPr spcFirstLastPara="0" vert="horz" wrap="square" lIns="27940" tIns="6985" rIns="27940" bIns="6985" numCol="1" spcCol="1270" anchor="ctr" anchorCtr="0">
-          <a:noAutofit/>
-        </a:bodyPr>
-        <a:lstStyle/>
-        <a:p>
-          <a:pPr lvl="0" algn="r" defTabSz="488950">
-            <a:lnSpc>
-              <a:spcPct val="90000"/>
-            </a:lnSpc>
-            <a:spcBef>
-              <a:spcPct val="0"/>
-            </a:spcBef>
-            <a:spcAft>
-              <a:spcPct val="35000"/>
-            </a:spcAft>
-          </a:pPr>
-          <a:r>
-            <a:rPr lang="de-DE" sz="1100" kern="1200" dirty="0"/>
-            <a:t>Meldet abgeschlossene Aufgaben zurück</a:t>
-          </a:r>
-        </a:p>
-      </dsp:txBody>
-      <dsp:txXfrm>
-        <a:off x="507010" y="3228432"/>
-        <a:ext cx="1809878" cy="347064"/>
-      </dsp:txXfrm>
-    </dsp:sp>
-    <dsp:sp modelId="{09D50221-D678-4A08-84F0-EE7F73877653}">
-      <dsp:nvSpPr>
-        <dsp:cNvPr id="0" name=""/>
-        <dsp:cNvSpPr/>
-      </dsp:nvSpPr>
-      <dsp:spPr>
-        <a:xfrm>
-          <a:off x="2802780" y="2418614"/>
-          <a:ext cx="2010976" cy="1041194"/>
-        </a:xfrm>
-        <a:prstGeom prst="rect">
-          <a:avLst/>
-        </a:prstGeom>
-        <a:solidFill>
-          <a:schemeClr val="accent1">
-            <a:hueOff val="0"/>
-            <a:satOff val="0"/>
-            <a:lumOff val="0"/>
-            <a:alphaOff val="0"/>
-          </a:schemeClr>
-        </a:solidFill>
-        <a:ln w="12700" cap="flat" cmpd="sng" algn="ctr">
-          <a:solidFill>
-            <a:schemeClr val="lt1">
-              <a:hueOff val="0"/>
-              <a:satOff val="0"/>
-              <a:lumOff val="0"/>
-              <a:alphaOff val="0"/>
-            </a:schemeClr>
-          </a:solidFill>
-          <a:prstDash val="solid"/>
-          <a:miter lim="800000"/>
-        </a:ln>
-        <a:effectLst/>
-      </dsp:spPr>
-      <dsp:style>
-        <a:lnRef idx="2">
-          <a:scrgbClr r="0" g="0" b="0"/>
-        </a:lnRef>
-        <a:fillRef idx="1">
-          <a:scrgbClr r="0" g="0" b="0"/>
-        </a:fillRef>
-        <a:effectRef idx="0">
-          <a:scrgbClr r="0" g="0" b="0"/>
-        </a:effectRef>
-        <a:fontRef idx="minor">
-          <a:schemeClr val="lt1"/>
-        </a:fontRef>
-      </dsp:style>
-      <dsp:txBody>
-        <a:bodyPr spcFirstLastPara="0" vert="horz" wrap="square" lIns="12065" tIns="12065" rIns="12065" bIns="146924" numCol="1" spcCol="1270" anchor="ctr" anchorCtr="0">
-          <a:noAutofit/>
-        </a:bodyPr>
-        <a:lstStyle/>
-        <a:p>
-          <a:pPr lvl="0" algn="ctr" defTabSz="844550">
-            <a:lnSpc>
-              <a:spcPct val="90000"/>
-            </a:lnSpc>
-            <a:spcBef>
-              <a:spcPct val="0"/>
-            </a:spcBef>
-            <a:spcAft>
-              <a:spcPct val="35000"/>
-            </a:spcAft>
-          </a:pPr>
-          <a:r>
-            <a:rPr lang="de-DE" sz="1900" kern="1200" dirty="0"/>
-            <a:t>Datenbankdesigner</a:t>
-          </a:r>
-        </a:p>
-      </dsp:txBody>
-      <dsp:txXfrm>
-        <a:off x="2802780" y="2418614"/>
-        <a:ext cx="2010976" cy="1041194"/>
-      </dsp:txXfrm>
-    </dsp:sp>
-    <dsp:sp modelId="{5681A1C3-F7F2-459E-B1EA-ADC0DF83F7F4}">
-      <dsp:nvSpPr>
-        <dsp:cNvPr id="0" name=""/>
-        <dsp:cNvSpPr/>
-      </dsp:nvSpPr>
-      <dsp:spPr>
-        <a:xfrm>
-          <a:off x="3204975" y="3228432"/>
-          <a:ext cx="1809878" cy="347064"/>
-        </a:xfrm>
-        <a:prstGeom prst="rect">
-          <a:avLst/>
-        </a:prstGeom>
-        <a:solidFill>
-          <a:schemeClr val="lt1">
-            <a:alpha val="90000"/>
-            <a:hueOff val="0"/>
-            <a:satOff val="0"/>
-            <a:lumOff val="0"/>
-            <a:alphaOff val="0"/>
-          </a:schemeClr>
-        </a:solidFill>
-        <a:ln w="12700" cap="flat" cmpd="sng" algn="ctr">
-          <a:solidFill>
-            <a:schemeClr val="accent1">
-              <a:hueOff val="0"/>
-              <a:satOff val="0"/>
-              <a:lumOff val="0"/>
-              <a:alphaOff val="0"/>
-            </a:schemeClr>
-          </a:solidFill>
-          <a:prstDash val="solid"/>
-          <a:miter lim="800000"/>
-        </a:ln>
-        <a:effectLst/>
-      </dsp:spPr>
-      <dsp:style>
-        <a:lnRef idx="2">
-          <a:scrgbClr r="0" g="0" b="0"/>
-        </a:lnRef>
-        <a:fillRef idx="1">
-          <a:scrgbClr r="0" g="0" b="0"/>
-        </a:fillRef>
-        <a:effectRef idx="0">
-          <a:scrgbClr r="0" g="0" b="0"/>
-        </a:effectRef>
-        <a:fontRef idx="minor"/>
-      </dsp:style>
-      <dsp:txBody>
-        <a:bodyPr spcFirstLastPara="0" vert="horz" wrap="square" lIns="27940" tIns="6985" rIns="27940" bIns="6985" numCol="1" spcCol="1270" anchor="ctr" anchorCtr="0">
-          <a:noAutofit/>
-        </a:bodyPr>
-        <a:lstStyle/>
-        <a:p>
-          <a:pPr lvl="0" algn="r" defTabSz="488950">
-            <a:lnSpc>
-              <a:spcPct val="90000"/>
-            </a:lnSpc>
-            <a:spcBef>
-              <a:spcPct val="0"/>
-            </a:spcBef>
-            <a:spcAft>
-              <a:spcPct val="35000"/>
-            </a:spcAft>
-          </a:pPr>
-          <a:r>
-            <a:rPr lang="de-DE" sz="1100" kern="1200" dirty="0"/>
-            <a:t>Meldet abgeschlossene Aufgaben zurück</a:t>
-          </a:r>
-        </a:p>
-      </dsp:txBody>
-      <dsp:txXfrm>
-        <a:off x="3204975" y="3228432"/>
-        <a:ext cx="1809878" cy="347064"/>
-      </dsp:txXfrm>
-    </dsp:sp>
-    <dsp:sp modelId="{7540C2E7-48D2-4EE8-87C4-B1638895265C}">
-      <dsp:nvSpPr>
-        <dsp:cNvPr id="0" name=""/>
-        <dsp:cNvSpPr/>
-      </dsp:nvSpPr>
-      <dsp:spPr>
-        <a:xfrm>
-          <a:off x="5500745" y="2418614"/>
-          <a:ext cx="2010976" cy="1041194"/>
-        </a:xfrm>
-        <a:prstGeom prst="rect">
-          <a:avLst/>
-        </a:prstGeom>
-        <a:solidFill>
-          <a:schemeClr val="accent1">
-            <a:hueOff val="0"/>
-            <a:satOff val="0"/>
-            <a:lumOff val="0"/>
-            <a:alphaOff val="0"/>
-          </a:schemeClr>
-        </a:solidFill>
-        <a:ln w="12700" cap="flat" cmpd="sng" algn="ctr">
-          <a:solidFill>
-            <a:schemeClr val="lt1">
-              <a:hueOff val="0"/>
-              <a:satOff val="0"/>
-              <a:lumOff val="0"/>
-              <a:alphaOff val="0"/>
-            </a:schemeClr>
-          </a:solidFill>
-          <a:prstDash val="solid"/>
-          <a:miter lim="800000"/>
-        </a:ln>
-        <a:effectLst/>
-      </dsp:spPr>
-      <dsp:style>
-        <a:lnRef idx="2">
-          <a:scrgbClr r="0" g="0" b="0"/>
-        </a:lnRef>
-        <a:fillRef idx="1">
-          <a:scrgbClr r="0" g="0" b="0"/>
-        </a:fillRef>
-        <a:effectRef idx="0">
-          <a:scrgbClr r="0" g="0" b="0"/>
-        </a:effectRef>
-        <a:fontRef idx="minor">
-          <a:schemeClr val="lt1"/>
-        </a:fontRef>
-      </dsp:style>
-      <dsp:txBody>
-        <a:bodyPr spcFirstLastPara="0" vert="horz" wrap="square" lIns="12065" tIns="12065" rIns="12065" bIns="146924" numCol="1" spcCol="1270" anchor="ctr" anchorCtr="0">
-          <a:noAutofit/>
-        </a:bodyPr>
-        <a:lstStyle/>
-        <a:p>
-          <a:pPr lvl="0" algn="ctr" defTabSz="844550">
-            <a:lnSpc>
-              <a:spcPct val="90000"/>
-            </a:lnSpc>
-            <a:spcBef>
-              <a:spcPct val="0"/>
-            </a:spcBef>
-            <a:spcAft>
-              <a:spcPct val="35000"/>
-            </a:spcAft>
-          </a:pPr>
-          <a:r>
-            <a:rPr lang="de-DE" sz="1900" kern="1200" dirty="0"/>
-            <a:t>Webdesigner</a:t>
-          </a:r>
-        </a:p>
-      </dsp:txBody>
-      <dsp:txXfrm>
-        <a:off x="5500745" y="2418614"/>
-        <a:ext cx="2010976" cy="1041194"/>
-      </dsp:txXfrm>
-    </dsp:sp>
-    <dsp:sp modelId="{210698F5-CF27-4953-810C-44A846F5EE01}">
-      <dsp:nvSpPr>
-        <dsp:cNvPr id="0" name=""/>
-        <dsp:cNvSpPr/>
-      </dsp:nvSpPr>
-      <dsp:spPr>
-        <a:xfrm>
-          <a:off x="5902940" y="3228432"/>
-          <a:ext cx="1809878" cy="347064"/>
-        </a:xfrm>
-        <a:prstGeom prst="rect">
-          <a:avLst/>
-        </a:prstGeom>
-        <a:solidFill>
-          <a:schemeClr val="lt1">
-            <a:alpha val="90000"/>
-            <a:hueOff val="0"/>
-            <a:satOff val="0"/>
-            <a:lumOff val="0"/>
-            <a:alphaOff val="0"/>
-          </a:schemeClr>
-        </a:solidFill>
-        <a:ln w="12700" cap="flat" cmpd="sng" algn="ctr">
-          <a:solidFill>
-            <a:schemeClr val="accent1">
-              <a:hueOff val="0"/>
-              <a:satOff val="0"/>
-              <a:lumOff val="0"/>
-              <a:alphaOff val="0"/>
-            </a:schemeClr>
-          </a:solidFill>
-          <a:prstDash val="solid"/>
-          <a:miter lim="800000"/>
-        </a:ln>
-        <a:effectLst/>
-      </dsp:spPr>
-      <dsp:style>
-        <a:lnRef idx="2">
-          <a:scrgbClr r="0" g="0" b="0"/>
-        </a:lnRef>
-        <a:fillRef idx="1">
-          <a:scrgbClr r="0" g="0" b="0"/>
-        </a:fillRef>
-        <a:effectRef idx="0">
-          <a:scrgbClr r="0" g="0" b="0"/>
-        </a:effectRef>
-        <a:fontRef idx="minor"/>
-      </dsp:style>
-      <dsp:txBody>
-        <a:bodyPr spcFirstLastPara="0" vert="horz" wrap="square" lIns="27940" tIns="6985" rIns="27940" bIns="6985" numCol="1" spcCol="1270" anchor="ctr" anchorCtr="0">
-          <a:noAutofit/>
-        </a:bodyPr>
-        <a:lstStyle/>
-        <a:p>
-          <a:pPr lvl="0" algn="r" defTabSz="488950">
-            <a:lnSpc>
-              <a:spcPct val="90000"/>
-            </a:lnSpc>
-            <a:spcBef>
-              <a:spcPct val="0"/>
-            </a:spcBef>
-            <a:spcAft>
-              <a:spcPct val="35000"/>
-            </a:spcAft>
-          </a:pPr>
-          <a:r>
-            <a:rPr lang="de-DE" sz="1100" kern="1200" dirty="0"/>
-            <a:t>Meldet abgeschlossene Aufgaben zurück</a:t>
-          </a:r>
-        </a:p>
-      </dsp:txBody>
-      <dsp:txXfrm>
-        <a:off x="5902940" y="3228432"/>
-        <a:ext cx="1809878" cy="347064"/>
-      </dsp:txXfrm>
-    </dsp:sp>
-    <dsp:sp modelId="{B7BCBAAF-BA9A-4699-B2A1-DF69996325E1}">
-      <dsp:nvSpPr>
-        <dsp:cNvPr id="0" name=""/>
-        <dsp:cNvSpPr/>
-      </dsp:nvSpPr>
-      <dsp:spPr>
-        <a:xfrm>
-          <a:off x="8198710" y="2418614"/>
-          <a:ext cx="2010976" cy="1041194"/>
-        </a:xfrm>
-        <a:prstGeom prst="rect">
-          <a:avLst/>
-        </a:prstGeom>
-        <a:solidFill>
-          <a:schemeClr val="accent1">
-            <a:hueOff val="0"/>
-            <a:satOff val="0"/>
-            <a:lumOff val="0"/>
-            <a:alphaOff val="0"/>
-          </a:schemeClr>
-        </a:solidFill>
-        <a:ln w="12700" cap="flat" cmpd="sng" algn="ctr">
-          <a:solidFill>
-            <a:schemeClr val="lt1">
-              <a:hueOff val="0"/>
-              <a:satOff val="0"/>
-              <a:lumOff val="0"/>
-              <a:alphaOff val="0"/>
-            </a:schemeClr>
-          </a:solidFill>
-          <a:prstDash val="solid"/>
-          <a:miter lim="800000"/>
-        </a:ln>
-        <a:effectLst/>
-      </dsp:spPr>
-      <dsp:style>
-        <a:lnRef idx="2">
-          <a:scrgbClr r="0" g="0" b="0"/>
-        </a:lnRef>
-        <a:fillRef idx="1">
-          <a:scrgbClr r="0" g="0" b="0"/>
-        </a:fillRef>
-        <a:effectRef idx="0">
-          <a:scrgbClr r="0" g="0" b="0"/>
-        </a:effectRef>
-        <a:fontRef idx="minor">
-          <a:schemeClr val="lt1"/>
-        </a:fontRef>
-      </dsp:style>
-      <dsp:txBody>
-        <a:bodyPr spcFirstLastPara="0" vert="horz" wrap="square" lIns="12065" tIns="12065" rIns="12065" bIns="146924" numCol="1" spcCol="1270" anchor="ctr" anchorCtr="0">
-          <a:noAutofit/>
-        </a:bodyPr>
-        <a:lstStyle/>
-        <a:p>
-          <a:pPr lvl="0" algn="ctr" defTabSz="844550">
-            <a:lnSpc>
-              <a:spcPct val="90000"/>
-            </a:lnSpc>
-            <a:spcBef>
-              <a:spcPct val="0"/>
-            </a:spcBef>
-            <a:spcAft>
-              <a:spcPct val="35000"/>
-            </a:spcAft>
-          </a:pPr>
-          <a:r>
-            <a:rPr lang="de-DE" sz="1900" kern="1200" dirty="0"/>
-            <a:t>Programmierer</a:t>
-          </a:r>
-        </a:p>
-      </dsp:txBody>
-      <dsp:txXfrm>
-        <a:off x="8198710" y="2418614"/>
-        <a:ext cx="2010976" cy="1041194"/>
-      </dsp:txXfrm>
-    </dsp:sp>
-    <dsp:sp modelId="{52B6D15F-3B47-4570-B14B-B91C71FCECDE}">
-      <dsp:nvSpPr>
-        <dsp:cNvPr id="0" name=""/>
-        <dsp:cNvSpPr/>
-      </dsp:nvSpPr>
-      <dsp:spPr>
-        <a:xfrm>
-          <a:off x="8600905" y="3228432"/>
-          <a:ext cx="1809878" cy="347064"/>
-        </a:xfrm>
-        <a:prstGeom prst="rect">
-          <a:avLst/>
-        </a:prstGeom>
-        <a:solidFill>
-          <a:schemeClr val="lt1">
-            <a:alpha val="90000"/>
-            <a:hueOff val="0"/>
-            <a:satOff val="0"/>
-            <a:lumOff val="0"/>
-            <a:alphaOff val="0"/>
-          </a:schemeClr>
-        </a:solidFill>
-        <a:ln w="12700" cap="flat" cmpd="sng" algn="ctr">
-          <a:solidFill>
-            <a:schemeClr val="accent1">
-              <a:hueOff val="0"/>
-              <a:satOff val="0"/>
-              <a:lumOff val="0"/>
-              <a:alphaOff val="0"/>
-            </a:schemeClr>
-          </a:solidFill>
-          <a:prstDash val="solid"/>
-          <a:miter lim="800000"/>
-        </a:ln>
-        <a:effectLst/>
-      </dsp:spPr>
-      <dsp:style>
-        <a:lnRef idx="2">
-          <a:scrgbClr r="0" g="0" b="0"/>
-        </a:lnRef>
-        <a:fillRef idx="1">
-          <a:scrgbClr r="0" g="0" b="0"/>
-        </a:fillRef>
-        <a:effectRef idx="0">
-          <a:scrgbClr r="0" g="0" b="0"/>
-        </a:effectRef>
-        <a:fontRef idx="minor"/>
-      </dsp:style>
-      <dsp:txBody>
-        <a:bodyPr spcFirstLastPara="0" vert="horz" wrap="square" lIns="27940" tIns="6985" rIns="27940" bIns="6985" numCol="1" spcCol="1270" anchor="ctr" anchorCtr="0">
-          <a:noAutofit/>
-        </a:bodyPr>
-        <a:lstStyle/>
-        <a:p>
-          <a:pPr lvl="0" algn="r" defTabSz="488950">
-            <a:lnSpc>
-              <a:spcPct val="90000"/>
-            </a:lnSpc>
-            <a:spcBef>
-              <a:spcPct val="0"/>
-            </a:spcBef>
-            <a:spcAft>
-              <a:spcPct val="35000"/>
-            </a:spcAft>
-          </a:pPr>
-          <a:r>
-            <a:rPr lang="de-DE" sz="1100" kern="1200" dirty="0"/>
-            <a:t>Meldet abgeschlossene Aufgaben zurück</a:t>
-          </a:r>
-        </a:p>
-      </dsp:txBody>
-      <dsp:txXfrm>
-        <a:off x="8600905" y="3228432"/>
-        <a:ext cx="1809878" cy="347064"/>
-      </dsp:txXfrm>
-    </dsp:sp>
   </dsp:spTree>
 </dsp:drawing>
 </file>
@@ -7090,396 +5334,6 @@
       <dsp:cNvGrpSpPr/>
     </dsp:nvGrpSpPr>
     <dsp:grpSpPr/>
-    <dsp:sp modelId="{2BF15467-0E49-4845-904D-0CEFB46FA313}">
-      <dsp:nvSpPr>
-        <dsp:cNvPr id="0" name=""/>
-        <dsp:cNvSpPr/>
-      </dsp:nvSpPr>
-      <dsp:spPr>
-        <a:xfrm>
-          <a:off x="0" y="39687"/>
-          <a:ext cx="3286125" cy="1971675"/>
-        </a:xfrm>
-        <a:prstGeom prst="rect">
-          <a:avLst/>
-        </a:prstGeom>
-        <a:solidFill>
-          <a:schemeClr val="accent1">
-            <a:hueOff val="0"/>
-            <a:satOff val="0"/>
-            <a:lumOff val="0"/>
-            <a:alphaOff val="0"/>
-          </a:schemeClr>
-        </a:solidFill>
-        <a:ln w="12700" cap="flat" cmpd="sng" algn="ctr">
-          <a:solidFill>
-            <a:schemeClr val="lt1">
-              <a:hueOff val="0"/>
-              <a:satOff val="0"/>
-              <a:lumOff val="0"/>
-              <a:alphaOff val="0"/>
-            </a:schemeClr>
-          </a:solidFill>
-          <a:prstDash val="solid"/>
-          <a:miter lim="800000"/>
-        </a:ln>
-        <a:effectLst/>
-      </dsp:spPr>
-      <dsp:style>
-        <a:lnRef idx="2">
-          <a:scrgbClr r="0" g="0" b="0"/>
-        </a:lnRef>
-        <a:fillRef idx="1">
-          <a:scrgbClr r="0" g="0" b="0"/>
-        </a:fillRef>
-        <a:effectRef idx="0">
-          <a:scrgbClr r="0" g="0" b="0"/>
-        </a:effectRef>
-        <a:fontRef idx="minor">
-          <a:schemeClr val="lt1"/>
-        </a:fontRef>
-      </dsp:style>
-      <dsp:txBody>
-        <a:bodyPr spcFirstLastPara="0" vert="horz" wrap="square" lIns="137160" tIns="137160" rIns="137160" bIns="137160" numCol="1" spcCol="1270" anchor="ctr" anchorCtr="0">
-          <a:noAutofit/>
-        </a:bodyPr>
-        <a:lstStyle/>
-        <a:p>
-          <a:pPr lvl="0" algn="ctr" defTabSz="1600200">
-            <a:lnSpc>
-              <a:spcPct val="90000"/>
-            </a:lnSpc>
-            <a:spcBef>
-              <a:spcPct val="0"/>
-            </a:spcBef>
-            <a:spcAft>
-              <a:spcPct val="35000"/>
-            </a:spcAft>
-          </a:pPr>
-          <a:r>
-            <a:rPr lang="de-DE" sz="3600" kern="1200" dirty="0" smtClean="0"/>
-            <a:t>Datensicherheit</a:t>
-          </a:r>
-          <a:endParaRPr lang="de-DE" sz="3600" kern="1200" dirty="0"/>
-        </a:p>
-      </dsp:txBody>
-      <dsp:txXfrm>
-        <a:off x="0" y="39687"/>
-        <a:ext cx="3286125" cy="1971675"/>
-      </dsp:txXfrm>
-    </dsp:sp>
-    <dsp:sp modelId="{0188721D-6F1B-4B02-9F54-119E56EAB73C}">
-      <dsp:nvSpPr>
-        <dsp:cNvPr id="0" name=""/>
-        <dsp:cNvSpPr/>
-      </dsp:nvSpPr>
-      <dsp:spPr>
-        <a:xfrm>
-          <a:off x="3614737" y="39687"/>
-          <a:ext cx="3286125" cy="1971675"/>
-        </a:xfrm>
-        <a:prstGeom prst="rect">
-          <a:avLst/>
-        </a:prstGeom>
-        <a:solidFill>
-          <a:schemeClr val="accent1">
-            <a:hueOff val="0"/>
-            <a:satOff val="0"/>
-            <a:lumOff val="0"/>
-            <a:alphaOff val="0"/>
-          </a:schemeClr>
-        </a:solidFill>
-        <a:ln w="12700" cap="flat" cmpd="sng" algn="ctr">
-          <a:solidFill>
-            <a:schemeClr val="lt1">
-              <a:hueOff val="0"/>
-              <a:satOff val="0"/>
-              <a:lumOff val="0"/>
-              <a:alphaOff val="0"/>
-            </a:schemeClr>
-          </a:solidFill>
-          <a:prstDash val="solid"/>
-          <a:miter lim="800000"/>
-        </a:ln>
-        <a:effectLst/>
-      </dsp:spPr>
-      <dsp:style>
-        <a:lnRef idx="2">
-          <a:scrgbClr r="0" g="0" b="0"/>
-        </a:lnRef>
-        <a:fillRef idx="1">
-          <a:scrgbClr r="0" g="0" b="0"/>
-        </a:fillRef>
-        <a:effectRef idx="0">
-          <a:scrgbClr r="0" g="0" b="0"/>
-        </a:effectRef>
-        <a:fontRef idx="minor">
-          <a:schemeClr val="lt1"/>
-        </a:fontRef>
-      </dsp:style>
-      <dsp:txBody>
-        <a:bodyPr spcFirstLastPara="0" vert="horz" wrap="square" lIns="137160" tIns="137160" rIns="137160" bIns="137160" numCol="1" spcCol="1270" anchor="ctr" anchorCtr="0">
-          <a:noAutofit/>
-        </a:bodyPr>
-        <a:lstStyle/>
-        <a:p>
-          <a:pPr lvl="0" algn="ctr" defTabSz="1600200">
-            <a:lnSpc>
-              <a:spcPct val="90000"/>
-            </a:lnSpc>
-            <a:spcBef>
-              <a:spcPct val="0"/>
-            </a:spcBef>
-            <a:spcAft>
-              <a:spcPct val="35000"/>
-            </a:spcAft>
-          </a:pPr>
-          <a:r>
-            <a:rPr lang="de-DE" sz="3600" kern="1200" dirty="0" smtClean="0"/>
-            <a:t>Datenschutz</a:t>
-          </a:r>
-          <a:endParaRPr lang="de-DE" sz="3600" kern="1200" dirty="0"/>
-        </a:p>
-      </dsp:txBody>
-      <dsp:txXfrm>
-        <a:off x="3614737" y="39687"/>
-        <a:ext cx="3286125" cy="1971675"/>
-      </dsp:txXfrm>
-    </dsp:sp>
-    <dsp:sp modelId="{0457ED69-F464-4661-BE61-A8DCC985B01C}">
-      <dsp:nvSpPr>
-        <dsp:cNvPr id="0" name=""/>
-        <dsp:cNvSpPr/>
-      </dsp:nvSpPr>
-      <dsp:spPr>
-        <a:xfrm>
-          <a:off x="7229475" y="39687"/>
-          <a:ext cx="3286125" cy="1971675"/>
-        </a:xfrm>
-        <a:prstGeom prst="rect">
-          <a:avLst/>
-        </a:prstGeom>
-        <a:solidFill>
-          <a:schemeClr val="accent1">
-            <a:hueOff val="0"/>
-            <a:satOff val="0"/>
-            <a:lumOff val="0"/>
-            <a:alphaOff val="0"/>
-          </a:schemeClr>
-        </a:solidFill>
-        <a:ln w="12700" cap="flat" cmpd="sng" algn="ctr">
-          <a:solidFill>
-            <a:schemeClr val="lt1">
-              <a:hueOff val="0"/>
-              <a:satOff val="0"/>
-              <a:lumOff val="0"/>
-              <a:alphaOff val="0"/>
-            </a:schemeClr>
-          </a:solidFill>
-          <a:prstDash val="solid"/>
-          <a:miter lim="800000"/>
-        </a:ln>
-        <a:effectLst/>
-      </dsp:spPr>
-      <dsp:style>
-        <a:lnRef idx="2">
-          <a:scrgbClr r="0" g="0" b="0"/>
-        </a:lnRef>
-        <a:fillRef idx="1">
-          <a:scrgbClr r="0" g="0" b="0"/>
-        </a:fillRef>
-        <a:effectRef idx="0">
-          <a:scrgbClr r="0" g="0" b="0"/>
-        </a:effectRef>
-        <a:fontRef idx="minor">
-          <a:schemeClr val="lt1"/>
-        </a:fontRef>
-      </dsp:style>
-      <dsp:txBody>
-        <a:bodyPr spcFirstLastPara="0" vert="horz" wrap="square" lIns="137160" tIns="137160" rIns="137160" bIns="137160" numCol="1" spcCol="1270" anchor="ctr" anchorCtr="0">
-          <a:noAutofit/>
-        </a:bodyPr>
-        <a:lstStyle/>
-        <a:p>
-          <a:pPr lvl="0" algn="ctr" defTabSz="1600200">
-            <a:lnSpc>
-              <a:spcPct val="90000"/>
-            </a:lnSpc>
-            <a:spcBef>
-              <a:spcPct val="0"/>
-            </a:spcBef>
-            <a:spcAft>
-              <a:spcPct val="35000"/>
-            </a:spcAft>
-          </a:pPr>
-          <a:r>
-            <a:rPr lang="de-DE" sz="3600" kern="1200" dirty="0" smtClean="0"/>
-            <a:t>Datenintegrität</a:t>
-          </a:r>
-          <a:endParaRPr lang="de-DE" sz="3600" kern="1200" dirty="0"/>
-        </a:p>
-      </dsp:txBody>
-      <dsp:txXfrm>
-        <a:off x="7229475" y="39687"/>
-        <a:ext cx="3286125" cy="1971675"/>
-      </dsp:txXfrm>
-    </dsp:sp>
-    <dsp:sp modelId="{C844A2F7-2701-4C05-ADAA-D6779AC6B298}">
-      <dsp:nvSpPr>
-        <dsp:cNvPr id="0" name=""/>
-        <dsp:cNvSpPr/>
-      </dsp:nvSpPr>
-      <dsp:spPr>
-        <a:xfrm>
-          <a:off x="1807368" y="2339975"/>
-          <a:ext cx="3286125" cy="1971675"/>
-        </a:xfrm>
-        <a:prstGeom prst="rect">
-          <a:avLst/>
-        </a:prstGeom>
-        <a:solidFill>
-          <a:schemeClr val="accent1">
-            <a:hueOff val="0"/>
-            <a:satOff val="0"/>
-            <a:lumOff val="0"/>
-            <a:alphaOff val="0"/>
-          </a:schemeClr>
-        </a:solidFill>
-        <a:ln w="12700" cap="flat" cmpd="sng" algn="ctr">
-          <a:solidFill>
-            <a:schemeClr val="lt1">
-              <a:hueOff val="0"/>
-              <a:satOff val="0"/>
-              <a:lumOff val="0"/>
-              <a:alphaOff val="0"/>
-            </a:schemeClr>
-          </a:solidFill>
-          <a:prstDash val="solid"/>
-          <a:miter lim="800000"/>
-        </a:ln>
-        <a:effectLst/>
-      </dsp:spPr>
-      <dsp:style>
-        <a:lnRef idx="2">
-          <a:scrgbClr r="0" g="0" b="0"/>
-        </a:lnRef>
-        <a:fillRef idx="1">
-          <a:scrgbClr r="0" g="0" b="0"/>
-        </a:fillRef>
-        <a:effectRef idx="0">
-          <a:scrgbClr r="0" g="0" b="0"/>
-        </a:effectRef>
-        <a:fontRef idx="minor">
-          <a:schemeClr val="lt1"/>
-        </a:fontRef>
-      </dsp:style>
-      <dsp:txBody>
-        <a:bodyPr spcFirstLastPara="0" vert="horz" wrap="square" lIns="137160" tIns="137160" rIns="137160" bIns="137160" numCol="1" spcCol="1270" anchor="ctr" anchorCtr="0">
-          <a:noAutofit/>
-        </a:bodyPr>
-        <a:lstStyle/>
-        <a:p>
-          <a:pPr lvl="0" algn="ctr" defTabSz="1600200">
-            <a:lnSpc>
-              <a:spcPct val="90000"/>
-            </a:lnSpc>
-            <a:spcBef>
-              <a:spcPct val="0"/>
-            </a:spcBef>
-            <a:spcAft>
-              <a:spcPct val="35000"/>
-            </a:spcAft>
-          </a:pPr>
-          <a:r>
-            <a:rPr lang="de-DE" sz="3600" kern="1200" dirty="0" smtClean="0"/>
-            <a:t>Benutzerrechte</a:t>
-          </a:r>
-          <a:endParaRPr lang="de-DE" sz="3600" kern="1200" dirty="0"/>
-        </a:p>
-      </dsp:txBody>
-      <dsp:txXfrm>
-        <a:off x="1807368" y="2339975"/>
-        <a:ext cx="3286125" cy="1971675"/>
-      </dsp:txXfrm>
-    </dsp:sp>
-    <dsp:sp modelId="{30A65BC7-4BFD-43AA-925D-03AB4AEE013B}">
-      <dsp:nvSpPr>
-        <dsp:cNvPr id="0" name=""/>
-        <dsp:cNvSpPr/>
-      </dsp:nvSpPr>
-      <dsp:spPr>
-        <a:xfrm>
-          <a:off x="5422106" y="2339975"/>
-          <a:ext cx="3286125" cy="1971675"/>
-        </a:xfrm>
-        <a:prstGeom prst="rect">
-          <a:avLst/>
-        </a:prstGeom>
-        <a:solidFill>
-          <a:schemeClr val="accent1">
-            <a:hueOff val="0"/>
-            <a:satOff val="0"/>
-            <a:lumOff val="0"/>
-            <a:alphaOff val="0"/>
-          </a:schemeClr>
-        </a:solidFill>
-        <a:ln w="12700" cap="flat" cmpd="sng" algn="ctr">
-          <a:solidFill>
-            <a:schemeClr val="lt1">
-              <a:hueOff val="0"/>
-              <a:satOff val="0"/>
-              <a:lumOff val="0"/>
-              <a:alphaOff val="0"/>
-            </a:schemeClr>
-          </a:solidFill>
-          <a:prstDash val="solid"/>
-          <a:miter lim="800000"/>
-        </a:ln>
-        <a:effectLst/>
-      </dsp:spPr>
-      <dsp:style>
-        <a:lnRef idx="2">
-          <a:scrgbClr r="0" g="0" b="0"/>
-        </a:lnRef>
-        <a:fillRef idx="1">
-          <a:scrgbClr r="0" g="0" b="0"/>
-        </a:fillRef>
-        <a:effectRef idx="0">
-          <a:scrgbClr r="0" g="0" b="0"/>
-        </a:effectRef>
-        <a:fontRef idx="minor">
-          <a:schemeClr val="lt1"/>
-        </a:fontRef>
-      </dsp:style>
-      <dsp:txBody>
-        <a:bodyPr spcFirstLastPara="0" vert="horz" wrap="square" lIns="137160" tIns="137160" rIns="137160" bIns="137160" numCol="1" spcCol="1270" anchor="ctr" anchorCtr="0">
-          <a:noAutofit/>
-        </a:bodyPr>
-        <a:lstStyle/>
-        <a:p>
-          <a:pPr lvl="0" algn="ctr" defTabSz="1600200">
-            <a:lnSpc>
-              <a:spcPct val="90000"/>
-            </a:lnSpc>
-            <a:spcBef>
-              <a:spcPct val="0"/>
-            </a:spcBef>
-            <a:spcAft>
-              <a:spcPct val="35000"/>
-            </a:spcAft>
-          </a:pPr>
-          <a:r>
-            <a:rPr lang="de-DE" sz="3600" kern="1200" dirty="0" smtClean="0"/>
-            <a:t>Gesetze</a:t>
-          </a:r>
-          <a:endParaRPr lang="de-DE" sz="3600" kern="1200" dirty="0"/>
-        </a:p>
-      </dsp:txBody>
-      <dsp:txXfrm>
-        <a:off x="5422106" y="2339975"/>
-        <a:ext cx="3286125" cy="1971675"/>
-      </dsp:txXfrm>
-    </dsp:sp>
   </dsp:spTree>
 </dsp:drawing>
 </file>
@@ -18610,6 +16464,1780 @@
           <a:p>
             <a:r>
               <a:rPr lang="de-DE" dirty="0"/>
+              <a:t>Chancen / Risiko Portfolio</a:t>
+            </a:r>
+          </a:p>
+        </p:txBody>
+      </p:sp>
+      <p:graphicFrame>
+        <p:nvGraphicFramePr>
+          <p:cNvPr id="6" name="Inhaltsplatzhalter 5"/>
+          <p:cNvGraphicFramePr>
+            <a:graphicFrameLocks noGrp="1"/>
+          </p:cNvGraphicFramePr>
+          <p:nvPr>
+            <p:ph idx="1"/>
+            <p:extLst/>
+          </p:nvPr>
+        </p:nvGraphicFramePr>
+        <p:xfrm>
+          <a:off x="838200" y="1825622"/>
+          <a:ext cx="10515600" cy="4735815"/>
+        </p:xfrm>
+        <a:graphic>
+          <a:graphicData uri="http://schemas.openxmlformats.org/drawingml/2006/table">
+            <a:tbl>
+              <a:tblPr firstRow="1" bandRow="1">
+                <a:tableStyleId>{5C22544A-7EE6-4342-B048-85BDC9FD1C3A}</a:tableStyleId>
+              </a:tblPr>
+              <a:tblGrid>
+                <a:gridCol w="2103120">
+                  <a:extLst>
+                    <a:ext uri="{9D8B030D-6E8A-4147-A177-3AD203B41FA5}">
+                      <a16:colId xmlns:a16="http://schemas.microsoft.com/office/drawing/2014/main" xmlns="" val="8867888"/>
+                    </a:ext>
+                  </a:extLst>
+                </a:gridCol>
+                <a:gridCol w="2103120">
+                  <a:extLst>
+                    <a:ext uri="{9D8B030D-6E8A-4147-A177-3AD203B41FA5}">
+                      <a16:colId xmlns:a16="http://schemas.microsoft.com/office/drawing/2014/main" xmlns="" val="1260557612"/>
+                    </a:ext>
+                  </a:extLst>
+                </a:gridCol>
+                <a:gridCol w="2103120">
+                  <a:extLst>
+                    <a:ext uri="{9D8B030D-6E8A-4147-A177-3AD203B41FA5}">
+                      <a16:colId xmlns:a16="http://schemas.microsoft.com/office/drawing/2014/main" xmlns="" val="1768088843"/>
+                    </a:ext>
+                  </a:extLst>
+                </a:gridCol>
+                <a:gridCol w="2103120">
+                  <a:extLst>
+                    <a:ext uri="{9D8B030D-6E8A-4147-A177-3AD203B41FA5}">
+                      <a16:colId xmlns:a16="http://schemas.microsoft.com/office/drawing/2014/main" xmlns="" val="2592898585"/>
+                    </a:ext>
+                  </a:extLst>
+                </a:gridCol>
+                <a:gridCol w="2103120">
+                  <a:extLst>
+                    <a:ext uri="{9D8B030D-6E8A-4147-A177-3AD203B41FA5}">
+                      <a16:colId xmlns:a16="http://schemas.microsoft.com/office/drawing/2014/main" xmlns="" val="3051220917"/>
+                    </a:ext>
+                  </a:extLst>
+                </a:gridCol>
+              </a:tblGrid>
+              <a:tr h="947163">
+                <a:tc>
+                  <a:txBody>
+                    <a:bodyPr/>
+                    <a:lstStyle/>
+                    <a:p>
+                      <a:r>
+                        <a:rPr lang="de-DE" sz="1800" b="0" dirty="0">
+                          <a:solidFill>
+                            <a:sysClr val="windowText" lastClr="000000"/>
+                          </a:solidFill>
+                        </a:rPr>
+                        <a:t>hoch</a:t>
+                      </a:r>
+                    </a:p>
+                  </a:txBody>
+                  <a:tcPr>
+                    <a:lnL w="12700" cap="flat" cmpd="sng" algn="ctr">
+                      <a:noFill/>
+                      <a:prstDash val="solid"/>
+                      <a:round/>
+                      <a:headEnd type="none" w="med" len="med"/>
+                      <a:tailEnd type="none" w="med" len="med"/>
+                    </a:lnL>
+                    <a:lnR w="12700" cap="flat" cmpd="sng" algn="ctr">
+                      <a:solidFill>
+                        <a:schemeClr val="tx1"/>
+                      </a:solidFill>
+                      <a:prstDash val="solid"/>
+                      <a:round/>
+                      <a:headEnd type="none" w="med" len="med"/>
+                      <a:tailEnd type="none" w="med" len="med"/>
+                    </a:lnR>
+                    <a:lnT w="12700" cap="flat" cmpd="sng" algn="ctr">
+                      <a:noFill/>
+                      <a:prstDash val="solid"/>
+                      <a:round/>
+                      <a:headEnd type="none" w="med" len="med"/>
+                      <a:tailEnd type="none" w="med" len="med"/>
+                    </a:lnT>
+                    <a:lnB w="12700" cap="flat" cmpd="sng" algn="ctr">
+                      <a:noFill/>
+                      <a:prstDash val="solid"/>
+                      <a:round/>
+                      <a:headEnd type="none" w="med" len="med"/>
+                      <a:tailEnd type="none" w="med" len="med"/>
+                    </a:lnB>
+                    <a:lnTlToBr w="12700" cmpd="sng">
+                      <a:noFill/>
+                      <a:prstDash val="solid"/>
+                    </a:lnTlToBr>
+                    <a:lnBlToTr w="12700" cmpd="sng">
+                      <a:noFill/>
+                      <a:prstDash val="solid"/>
+                    </a:lnBlToTr>
+                    <a:solidFill>
+                      <a:schemeClr val="bg1"/>
+                    </a:solidFill>
+                  </a:tcPr>
+                </a:tc>
+                <a:tc>
+                  <a:txBody>
+                    <a:bodyPr/>
+                    <a:lstStyle/>
+                    <a:p>
+                      <a:endParaRPr lang="de-DE" sz="1800" b="0" dirty="0"/>
+                    </a:p>
+                  </a:txBody>
+                  <a:tcPr>
+                    <a:lnL w="12700" cap="flat" cmpd="sng" algn="ctr">
+                      <a:solidFill>
+                        <a:schemeClr val="tx1"/>
+                      </a:solidFill>
+                      <a:prstDash val="solid"/>
+                      <a:round/>
+                      <a:headEnd type="none" w="med" len="med"/>
+                      <a:tailEnd type="none" w="med" len="med"/>
+                    </a:lnL>
+                    <a:lnR w="12700" cap="flat" cmpd="sng" algn="ctr">
+                      <a:solidFill>
+                        <a:schemeClr val="tx1"/>
+                      </a:solidFill>
+                      <a:prstDash val="solid"/>
+                      <a:round/>
+                      <a:headEnd type="none" w="med" len="med"/>
+                      <a:tailEnd type="none" w="med" len="med"/>
+                    </a:lnR>
+                    <a:lnT w="12700" cap="flat" cmpd="sng" algn="ctr">
+                      <a:solidFill>
+                        <a:schemeClr val="tx1"/>
+                      </a:solidFill>
+                      <a:prstDash val="solid"/>
+                      <a:round/>
+                      <a:headEnd type="none" w="med" len="med"/>
+                      <a:tailEnd type="none" w="med" len="med"/>
+                    </a:lnT>
+                    <a:lnB w="12700" cap="flat" cmpd="sng" algn="ctr">
+                      <a:solidFill>
+                        <a:schemeClr val="tx1"/>
+                      </a:solidFill>
+                      <a:prstDash val="solid"/>
+                      <a:round/>
+                      <a:headEnd type="none" w="med" len="med"/>
+                      <a:tailEnd type="none" w="med" len="med"/>
+                    </a:lnB>
+                    <a:solidFill>
+                      <a:schemeClr val="bg1"/>
+                    </a:solidFill>
+                  </a:tcPr>
+                </a:tc>
+                <a:tc>
+                  <a:txBody>
+                    <a:bodyPr/>
+                    <a:lstStyle/>
+                    <a:p>
+                      <a:endParaRPr lang="de-DE" sz="1800" b="0"/>
+                    </a:p>
+                  </a:txBody>
+                  <a:tcPr>
+                    <a:lnL w="12700" cap="flat" cmpd="sng" algn="ctr">
+                      <a:solidFill>
+                        <a:schemeClr val="tx1"/>
+                      </a:solidFill>
+                      <a:prstDash val="solid"/>
+                      <a:round/>
+                      <a:headEnd type="none" w="med" len="med"/>
+                      <a:tailEnd type="none" w="med" len="med"/>
+                    </a:lnL>
+                    <a:lnR w="12700" cap="flat" cmpd="sng" algn="ctr">
+                      <a:solidFill>
+                        <a:schemeClr val="tx1"/>
+                      </a:solidFill>
+                      <a:prstDash val="solid"/>
+                      <a:round/>
+                      <a:headEnd type="none" w="med" len="med"/>
+                      <a:tailEnd type="none" w="med" len="med"/>
+                    </a:lnR>
+                    <a:lnT w="12700" cap="flat" cmpd="sng" algn="ctr">
+                      <a:solidFill>
+                        <a:schemeClr val="tx1"/>
+                      </a:solidFill>
+                      <a:prstDash val="solid"/>
+                      <a:round/>
+                      <a:headEnd type="none" w="med" len="med"/>
+                      <a:tailEnd type="none" w="med" len="med"/>
+                    </a:lnT>
+                    <a:lnB w="12700" cap="flat" cmpd="sng" algn="ctr">
+                      <a:solidFill>
+                        <a:schemeClr val="tx1"/>
+                      </a:solidFill>
+                      <a:prstDash val="solid"/>
+                      <a:round/>
+                      <a:headEnd type="none" w="med" len="med"/>
+                      <a:tailEnd type="none" w="med" len="med"/>
+                    </a:lnB>
+                    <a:solidFill>
+                      <a:schemeClr val="bg1"/>
+                    </a:solidFill>
+                  </a:tcPr>
+                </a:tc>
+                <a:tc>
+                  <a:txBody>
+                    <a:bodyPr/>
+                    <a:lstStyle/>
+                    <a:p>
+                      <a:endParaRPr lang="de-DE" sz="1800" b="0"/>
+                    </a:p>
+                  </a:txBody>
+                  <a:tcPr>
+                    <a:lnL w="12700" cap="flat" cmpd="sng" algn="ctr">
+                      <a:solidFill>
+                        <a:schemeClr val="tx1"/>
+                      </a:solidFill>
+                      <a:prstDash val="solid"/>
+                      <a:round/>
+                      <a:headEnd type="none" w="med" len="med"/>
+                      <a:tailEnd type="none" w="med" len="med"/>
+                    </a:lnL>
+                    <a:lnR w="12700" cap="flat" cmpd="sng" algn="ctr">
+                      <a:solidFill>
+                        <a:schemeClr val="tx1"/>
+                      </a:solidFill>
+                      <a:prstDash val="solid"/>
+                      <a:round/>
+                      <a:headEnd type="none" w="med" len="med"/>
+                      <a:tailEnd type="none" w="med" len="med"/>
+                    </a:lnR>
+                    <a:lnT w="12700" cap="flat" cmpd="sng" algn="ctr">
+                      <a:solidFill>
+                        <a:schemeClr val="tx1"/>
+                      </a:solidFill>
+                      <a:prstDash val="solid"/>
+                      <a:round/>
+                      <a:headEnd type="none" w="med" len="med"/>
+                      <a:tailEnd type="none" w="med" len="med"/>
+                    </a:lnT>
+                    <a:lnB w="12700" cap="flat" cmpd="sng" algn="ctr">
+                      <a:solidFill>
+                        <a:schemeClr val="tx1"/>
+                      </a:solidFill>
+                      <a:prstDash val="solid"/>
+                      <a:round/>
+                      <a:headEnd type="none" w="med" len="med"/>
+                      <a:tailEnd type="none" w="med" len="med"/>
+                    </a:lnB>
+                    <a:solidFill>
+                      <a:schemeClr val="bg1"/>
+                    </a:solidFill>
+                  </a:tcPr>
+                </a:tc>
+                <a:tc>
+                  <a:txBody>
+                    <a:bodyPr/>
+                    <a:lstStyle/>
+                    <a:p>
+                      <a:endParaRPr lang="de-DE" sz="1800" b="0"/>
+                    </a:p>
+                  </a:txBody>
+                  <a:tcPr>
+                    <a:lnL w="12700" cap="flat" cmpd="sng" algn="ctr">
+                      <a:solidFill>
+                        <a:schemeClr val="tx1"/>
+                      </a:solidFill>
+                      <a:prstDash val="solid"/>
+                      <a:round/>
+                      <a:headEnd type="none" w="med" len="med"/>
+                      <a:tailEnd type="none" w="med" len="med"/>
+                    </a:lnL>
+                    <a:lnR w="12700" cap="flat" cmpd="sng" algn="ctr">
+                      <a:solidFill>
+                        <a:schemeClr val="tx1"/>
+                      </a:solidFill>
+                      <a:prstDash val="solid"/>
+                      <a:round/>
+                      <a:headEnd type="none" w="med" len="med"/>
+                      <a:tailEnd type="none" w="med" len="med"/>
+                    </a:lnR>
+                    <a:lnT w="12700" cap="flat" cmpd="sng" algn="ctr">
+                      <a:solidFill>
+                        <a:schemeClr val="tx1"/>
+                      </a:solidFill>
+                      <a:prstDash val="solid"/>
+                      <a:round/>
+                      <a:headEnd type="none" w="med" len="med"/>
+                      <a:tailEnd type="none" w="med" len="med"/>
+                    </a:lnT>
+                    <a:lnB w="12700" cap="flat" cmpd="sng" algn="ctr">
+                      <a:solidFill>
+                        <a:schemeClr val="tx1"/>
+                      </a:solidFill>
+                      <a:prstDash val="solid"/>
+                      <a:round/>
+                      <a:headEnd type="none" w="med" len="med"/>
+                      <a:tailEnd type="none" w="med" len="med"/>
+                    </a:lnB>
+                    <a:solidFill>
+                      <a:schemeClr val="bg1"/>
+                    </a:solidFill>
+                  </a:tcPr>
+                </a:tc>
+                <a:extLst>
+                  <a:ext uri="{0D108BD9-81ED-4DB2-BD59-A6C34878D82A}">
+                    <a16:rowId xmlns:a16="http://schemas.microsoft.com/office/drawing/2014/main" xmlns="" val="3144234582"/>
+                  </a:ext>
+                </a:extLst>
+              </a:tr>
+              <a:tr h="947163">
+                <a:tc>
+                  <a:txBody>
+                    <a:bodyPr/>
+                    <a:lstStyle/>
+                    <a:p>
+                      <a:r>
+                        <a:rPr lang="de-DE" sz="1800" b="0" dirty="0"/>
+                        <a:t>eher</a:t>
+                      </a:r>
+                      <a:r>
+                        <a:rPr lang="de-DE" sz="1800" b="0" baseline="0" dirty="0"/>
+                        <a:t> hoch</a:t>
+                      </a:r>
+                      <a:endParaRPr lang="de-DE" sz="1800" b="0" dirty="0"/>
+                    </a:p>
+                  </a:txBody>
+                  <a:tcPr>
+                    <a:lnL w="12700" cap="flat" cmpd="sng" algn="ctr">
+                      <a:noFill/>
+                      <a:prstDash val="solid"/>
+                      <a:round/>
+                      <a:headEnd type="none" w="med" len="med"/>
+                      <a:tailEnd type="none" w="med" len="med"/>
+                    </a:lnL>
+                    <a:lnR w="12700" cap="flat" cmpd="sng" algn="ctr">
+                      <a:solidFill>
+                        <a:schemeClr val="tx1"/>
+                      </a:solidFill>
+                      <a:prstDash val="solid"/>
+                      <a:round/>
+                      <a:headEnd type="none" w="med" len="med"/>
+                      <a:tailEnd type="none" w="med" len="med"/>
+                    </a:lnR>
+                    <a:lnT w="12700" cap="flat" cmpd="sng" algn="ctr">
+                      <a:noFill/>
+                      <a:prstDash val="solid"/>
+                      <a:round/>
+                      <a:headEnd type="none" w="med" len="med"/>
+                      <a:tailEnd type="none" w="med" len="med"/>
+                    </a:lnT>
+                    <a:lnB w="12700" cap="flat" cmpd="sng" algn="ctr">
+                      <a:noFill/>
+                      <a:prstDash val="solid"/>
+                      <a:round/>
+                      <a:headEnd type="none" w="med" len="med"/>
+                      <a:tailEnd type="none" w="med" len="med"/>
+                    </a:lnB>
+                    <a:lnTlToBr w="12700" cmpd="sng">
+                      <a:noFill/>
+                      <a:prstDash val="solid"/>
+                    </a:lnTlToBr>
+                    <a:lnBlToTr w="12700" cmpd="sng">
+                      <a:noFill/>
+                      <a:prstDash val="solid"/>
+                    </a:lnBlToTr>
+                    <a:solidFill>
+                      <a:schemeClr val="bg1"/>
+                    </a:solidFill>
+                  </a:tcPr>
+                </a:tc>
+                <a:tc>
+                  <a:txBody>
+                    <a:bodyPr/>
+                    <a:lstStyle/>
+                    <a:p>
+                      <a:endParaRPr lang="de-DE" sz="1800" b="0" dirty="0"/>
+                    </a:p>
+                  </a:txBody>
+                  <a:tcPr>
+                    <a:lnL w="12700" cap="flat" cmpd="sng" algn="ctr">
+                      <a:solidFill>
+                        <a:schemeClr val="tx1"/>
+                      </a:solidFill>
+                      <a:prstDash val="solid"/>
+                      <a:round/>
+                      <a:headEnd type="none" w="med" len="med"/>
+                      <a:tailEnd type="none" w="med" len="med"/>
+                    </a:lnL>
+                    <a:lnR w="12700" cap="flat" cmpd="sng" algn="ctr">
+                      <a:solidFill>
+                        <a:schemeClr val="tx1"/>
+                      </a:solidFill>
+                      <a:prstDash val="solid"/>
+                      <a:round/>
+                      <a:headEnd type="none" w="med" len="med"/>
+                      <a:tailEnd type="none" w="med" len="med"/>
+                    </a:lnR>
+                    <a:lnT w="12700" cap="flat" cmpd="sng" algn="ctr">
+                      <a:solidFill>
+                        <a:schemeClr val="tx1"/>
+                      </a:solidFill>
+                      <a:prstDash val="solid"/>
+                      <a:round/>
+                      <a:headEnd type="none" w="med" len="med"/>
+                      <a:tailEnd type="none" w="med" len="med"/>
+                    </a:lnT>
+                    <a:lnB w="12700" cap="flat" cmpd="sng" algn="ctr">
+                      <a:solidFill>
+                        <a:schemeClr val="tx1"/>
+                      </a:solidFill>
+                      <a:prstDash val="solid"/>
+                      <a:round/>
+                      <a:headEnd type="none" w="med" len="med"/>
+                      <a:tailEnd type="none" w="med" len="med"/>
+                    </a:lnB>
+                    <a:solidFill>
+                      <a:schemeClr val="bg1"/>
+                    </a:solidFill>
+                  </a:tcPr>
+                </a:tc>
+                <a:tc>
+                  <a:txBody>
+                    <a:bodyPr/>
+                    <a:lstStyle/>
+                    <a:p>
+                      <a:endParaRPr lang="de-DE" sz="1800" b="0" dirty="0"/>
+                    </a:p>
+                  </a:txBody>
+                  <a:tcPr>
+                    <a:lnL w="12700" cap="flat" cmpd="sng" algn="ctr">
+                      <a:solidFill>
+                        <a:schemeClr val="tx1"/>
+                      </a:solidFill>
+                      <a:prstDash val="solid"/>
+                      <a:round/>
+                      <a:headEnd type="none" w="med" len="med"/>
+                      <a:tailEnd type="none" w="med" len="med"/>
+                    </a:lnL>
+                    <a:lnR w="12700" cap="flat" cmpd="sng" algn="ctr">
+                      <a:solidFill>
+                        <a:schemeClr val="tx1"/>
+                      </a:solidFill>
+                      <a:prstDash val="solid"/>
+                      <a:round/>
+                      <a:headEnd type="none" w="med" len="med"/>
+                      <a:tailEnd type="none" w="med" len="med"/>
+                    </a:lnR>
+                    <a:lnT w="12700" cap="flat" cmpd="sng" algn="ctr">
+                      <a:solidFill>
+                        <a:schemeClr val="tx1"/>
+                      </a:solidFill>
+                      <a:prstDash val="solid"/>
+                      <a:round/>
+                      <a:headEnd type="none" w="med" len="med"/>
+                      <a:tailEnd type="none" w="med" len="med"/>
+                    </a:lnT>
+                    <a:lnB w="12700" cap="flat" cmpd="sng" algn="ctr">
+                      <a:solidFill>
+                        <a:schemeClr val="tx1"/>
+                      </a:solidFill>
+                      <a:prstDash val="solid"/>
+                      <a:round/>
+                      <a:headEnd type="none" w="med" len="med"/>
+                      <a:tailEnd type="none" w="med" len="med"/>
+                    </a:lnB>
+                    <a:solidFill>
+                      <a:schemeClr val="bg1"/>
+                    </a:solidFill>
+                  </a:tcPr>
+                </a:tc>
+                <a:tc>
+                  <a:txBody>
+                    <a:bodyPr/>
+                    <a:lstStyle/>
+                    <a:p>
+                      <a:endParaRPr lang="de-DE" sz="1800" b="0"/>
+                    </a:p>
+                  </a:txBody>
+                  <a:tcPr>
+                    <a:lnL w="12700" cap="flat" cmpd="sng" algn="ctr">
+                      <a:solidFill>
+                        <a:schemeClr val="tx1"/>
+                      </a:solidFill>
+                      <a:prstDash val="solid"/>
+                      <a:round/>
+                      <a:headEnd type="none" w="med" len="med"/>
+                      <a:tailEnd type="none" w="med" len="med"/>
+                    </a:lnL>
+                    <a:lnR w="12700" cap="flat" cmpd="sng" algn="ctr">
+                      <a:solidFill>
+                        <a:schemeClr val="tx1"/>
+                      </a:solidFill>
+                      <a:prstDash val="solid"/>
+                      <a:round/>
+                      <a:headEnd type="none" w="med" len="med"/>
+                      <a:tailEnd type="none" w="med" len="med"/>
+                    </a:lnR>
+                    <a:lnT w="12700" cap="flat" cmpd="sng" algn="ctr">
+                      <a:solidFill>
+                        <a:schemeClr val="tx1"/>
+                      </a:solidFill>
+                      <a:prstDash val="solid"/>
+                      <a:round/>
+                      <a:headEnd type="none" w="med" len="med"/>
+                      <a:tailEnd type="none" w="med" len="med"/>
+                    </a:lnT>
+                    <a:lnB w="12700" cap="flat" cmpd="sng" algn="ctr">
+                      <a:solidFill>
+                        <a:schemeClr val="tx1"/>
+                      </a:solidFill>
+                      <a:prstDash val="solid"/>
+                      <a:round/>
+                      <a:headEnd type="none" w="med" len="med"/>
+                      <a:tailEnd type="none" w="med" len="med"/>
+                    </a:lnB>
+                    <a:solidFill>
+                      <a:schemeClr val="bg1"/>
+                    </a:solidFill>
+                  </a:tcPr>
+                </a:tc>
+                <a:tc>
+                  <a:txBody>
+                    <a:bodyPr/>
+                    <a:lstStyle/>
+                    <a:p>
+                      <a:endParaRPr lang="de-DE" sz="1800" b="0"/>
+                    </a:p>
+                  </a:txBody>
+                  <a:tcPr>
+                    <a:lnL w="12700" cap="flat" cmpd="sng" algn="ctr">
+                      <a:solidFill>
+                        <a:schemeClr val="tx1"/>
+                      </a:solidFill>
+                      <a:prstDash val="solid"/>
+                      <a:round/>
+                      <a:headEnd type="none" w="med" len="med"/>
+                      <a:tailEnd type="none" w="med" len="med"/>
+                    </a:lnL>
+                    <a:lnR w="12700" cap="flat" cmpd="sng" algn="ctr">
+                      <a:solidFill>
+                        <a:schemeClr val="tx1"/>
+                      </a:solidFill>
+                      <a:prstDash val="solid"/>
+                      <a:round/>
+                      <a:headEnd type="none" w="med" len="med"/>
+                      <a:tailEnd type="none" w="med" len="med"/>
+                    </a:lnR>
+                    <a:lnT w="12700" cap="flat" cmpd="sng" algn="ctr">
+                      <a:solidFill>
+                        <a:schemeClr val="tx1"/>
+                      </a:solidFill>
+                      <a:prstDash val="solid"/>
+                      <a:round/>
+                      <a:headEnd type="none" w="med" len="med"/>
+                      <a:tailEnd type="none" w="med" len="med"/>
+                    </a:lnT>
+                    <a:lnB w="12700" cap="flat" cmpd="sng" algn="ctr">
+                      <a:solidFill>
+                        <a:schemeClr val="tx1"/>
+                      </a:solidFill>
+                      <a:prstDash val="solid"/>
+                      <a:round/>
+                      <a:headEnd type="none" w="med" len="med"/>
+                      <a:tailEnd type="none" w="med" len="med"/>
+                    </a:lnB>
+                    <a:solidFill>
+                      <a:schemeClr val="bg1"/>
+                    </a:solidFill>
+                  </a:tcPr>
+                </a:tc>
+                <a:extLst>
+                  <a:ext uri="{0D108BD9-81ED-4DB2-BD59-A6C34878D82A}">
+                    <a16:rowId xmlns:a16="http://schemas.microsoft.com/office/drawing/2014/main" xmlns="" val="1099345563"/>
+                  </a:ext>
+                </a:extLst>
+              </a:tr>
+              <a:tr h="947163">
+                <a:tc>
+                  <a:txBody>
+                    <a:bodyPr/>
+                    <a:lstStyle/>
+                    <a:p>
+                      <a:r>
+                        <a:rPr lang="de-DE" sz="1800" b="0" dirty="0"/>
+                        <a:t>eher </a:t>
+                      </a:r>
+                      <a:r>
+                        <a:rPr lang="de-DE" sz="1800" b="0" dirty="0" err="1"/>
+                        <a:t>niedirg</a:t>
+                      </a:r>
+                      <a:endParaRPr lang="de-DE" sz="1800" b="0" dirty="0"/>
+                    </a:p>
+                  </a:txBody>
+                  <a:tcPr>
+                    <a:lnL w="12700" cap="flat" cmpd="sng" algn="ctr">
+                      <a:noFill/>
+                      <a:prstDash val="solid"/>
+                      <a:round/>
+                      <a:headEnd type="none" w="med" len="med"/>
+                      <a:tailEnd type="none" w="med" len="med"/>
+                    </a:lnL>
+                    <a:lnR w="12700" cap="flat" cmpd="sng" algn="ctr">
+                      <a:solidFill>
+                        <a:schemeClr val="tx1"/>
+                      </a:solidFill>
+                      <a:prstDash val="solid"/>
+                      <a:round/>
+                      <a:headEnd type="none" w="med" len="med"/>
+                      <a:tailEnd type="none" w="med" len="med"/>
+                    </a:lnR>
+                    <a:lnT w="12700" cap="flat" cmpd="sng" algn="ctr">
+                      <a:noFill/>
+                      <a:prstDash val="solid"/>
+                      <a:round/>
+                      <a:headEnd type="none" w="med" len="med"/>
+                      <a:tailEnd type="none" w="med" len="med"/>
+                    </a:lnT>
+                    <a:lnB w="12700" cap="flat" cmpd="sng" algn="ctr">
+                      <a:noFill/>
+                      <a:prstDash val="solid"/>
+                      <a:round/>
+                      <a:headEnd type="none" w="med" len="med"/>
+                      <a:tailEnd type="none" w="med" len="med"/>
+                    </a:lnB>
+                    <a:lnTlToBr w="12700" cmpd="sng">
+                      <a:noFill/>
+                      <a:prstDash val="solid"/>
+                    </a:lnTlToBr>
+                    <a:lnBlToTr w="12700" cmpd="sng">
+                      <a:noFill/>
+                      <a:prstDash val="solid"/>
+                    </a:lnBlToTr>
+                    <a:solidFill>
+                      <a:schemeClr val="bg1"/>
+                    </a:solidFill>
+                  </a:tcPr>
+                </a:tc>
+                <a:tc>
+                  <a:txBody>
+                    <a:bodyPr/>
+                    <a:lstStyle/>
+                    <a:p>
+                      <a:endParaRPr lang="de-DE" sz="1800" b="0"/>
+                    </a:p>
+                  </a:txBody>
+                  <a:tcPr>
+                    <a:lnL w="12700" cap="flat" cmpd="sng" algn="ctr">
+                      <a:solidFill>
+                        <a:schemeClr val="tx1"/>
+                      </a:solidFill>
+                      <a:prstDash val="solid"/>
+                      <a:round/>
+                      <a:headEnd type="none" w="med" len="med"/>
+                      <a:tailEnd type="none" w="med" len="med"/>
+                    </a:lnL>
+                    <a:lnR w="12700" cap="flat" cmpd="sng" algn="ctr">
+                      <a:solidFill>
+                        <a:schemeClr val="tx1"/>
+                      </a:solidFill>
+                      <a:prstDash val="solid"/>
+                      <a:round/>
+                      <a:headEnd type="none" w="med" len="med"/>
+                      <a:tailEnd type="none" w="med" len="med"/>
+                    </a:lnR>
+                    <a:lnT w="12700" cap="flat" cmpd="sng" algn="ctr">
+                      <a:solidFill>
+                        <a:schemeClr val="tx1"/>
+                      </a:solidFill>
+                      <a:prstDash val="solid"/>
+                      <a:round/>
+                      <a:headEnd type="none" w="med" len="med"/>
+                      <a:tailEnd type="none" w="med" len="med"/>
+                    </a:lnT>
+                    <a:lnB w="12700" cap="flat" cmpd="sng" algn="ctr">
+                      <a:solidFill>
+                        <a:schemeClr val="tx1"/>
+                      </a:solidFill>
+                      <a:prstDash val="solid"/>
+                      <a:round/>
+                      <a:headEnd type="none" w="med" len="med"/>
+                      <a:tailEnd type="none" w="med" len="med"/>
+                    </a:lnB>
+                    <a:solidFill>
+                      <a:schemeClr val="bg1"/>
+                    </a:solidFill>
+                  </a:tcPr>
+                </a:tc>
+                <a:tc>
+                  <a:txBody>
+                    <a:bodyPr/>
+                    <a:lstStyle/>
+                    <a:p>
+                      <a:endParaRPr lang="de-DE" sz="1800" b="0" dirty="0"/>
+                    </a:p>
+                  </a:txBody>
+                  <a:tcPr>
+                    <a:lnL w="12700" cap="flat" cmpd="sng" algn="ctr">
+                      <a:solidFill>
+                        <a:schemeClr val="tx1"/>
+                      </a:solidFill>
+                      <a:prstDash val="solid"/>
+                      <a:round/>
+                      <a:headEnd type="none" w="med" len="med"/>
+                      <a:tailEnd type="none" w="med" len="med"/>
+                    </a:lnL>
+                    <a:lnR w="12700" cap="flat" cmpd="sng" algn="ctr">
+                      <a:solidFill>
+                        <a:schemeClr val="tx1"/>
+                      </a:solidFill>
+                      <a:prstDash val="solid"/>
+                      <a:round/>
+                      <a:headEnd type="none" w="med" len="med"/>
+                      <a:tailEnd type="none" w="med" len="med"/>
+                    </a:lnR>
+                    <a:lnT w="12700" cap="flat" cmpd="sng" algn="ctr">
+                      <a:solidFill>
+                        <a:schemeClr val="tx1"/>
+                      </a:solidFill>
+                      <a:prstDash val="solid"/>
+                      <a:round/>
+                      <a:headEnd type="none" w="med" len="med"/>
+                      <a:tailEnd type="none" w="med" len="med"/>
+                    </a:lnT>
+                    <a:lnB w="12700" cap="flat" cmpd="sng" algn="ctr">
+                      <a:solidFill>
+                        <a:schemeClr val="tx1"/>
+                      </a:solidFill>
+                      <a:prstDash val="solid"/>
+                      <a:round/>
+                      <a:headEnd type="none" w="med" len="med"/>
+                      <a:tailEnd type="none" w="med" len="med"/>
+                    </a:lnB>
+                    <a:solidFill>
+                      <a:schemeClr val="bg1"/>
+                    </a:solidFill>
+                  </a:tcPr>
+                </a:tc>
+                <a:tc>
+                  <a:txBody>
+                    <a:bodyPr/>
+                    <a:lstStyle/>
+                    <a:p>
+                      <a:endParaRPr lang="de-DE" sz="1800" b="0"/>
+                    </a:p>
+                  </a:txBody>
+                  <a:tcPr>
+                    <a:lnL w="12700" cap="flat" cmpd="sng" algn="ctr">
+                      <a:solidFill>
+                        <a:schemeClr val="tx1"/>
+                      </a:solidFill>
+                      <a:prstDash val="solid"/>
+                      <a:round/>
+                      <a:headEnd type="none" w="med" len="med"/>
+                      <a:tailEnd type="none" w="med" len="med"/>
+                    </a:lnL>
+                    <a:lnR w="12700" cap="flat" cmpd="sng" algn="ctr">
+                      <a:solidFill>
+                        <a:schemeClr val="tx1"/>
+                      </a:solidFill>
+                      <a:prstDash val="solid"/>
+                      <a:round/>
+                      <a:headEnd type="none" w="med" len="med"/>
+                      <a:tailEnd type="none" w="med" len="med"/>
+                    </a:lnR>
+                    <a:lnT w="12700" cap="flat" cmpd="sng" algn="ctr">
+                      <a:solidFill>
+                        <a:schemeClr val="tx1"/>
+                      </a:solidFill>
+                      <a:prstDash val="solid"/>
+                      <a:round/>
+                      <a:headEnd type="none" w="med" len="med"/>
+                      <a:tailEnd type="none" w="med" len="med"/>
+                    </a:lnT>
+                    <a:lnB w="12700" cap="flat" cmpd="sng" algn="ctr">
+                      <a:solidFill>
+                        <a:schemeClr val="tx1"/>
+                      </a:solidFill>
+                      <a:prstDash val="solid"/>
+                      <a:round/>
+                      <a:headEnd type="none" w="med" len="med"/>
+                      <a:tailEnd type="none" w="med" len="med"/>
+                    </a:lnB>
+                    <a:solidFill>
+                      <a:schemeClr val="bg1"/>
+                    </a:solidFill>
+                  </a:tcPr>
+                </a:tc>
+                <a:tc>
+                  <a:txBody>
+                    <a:bodyPr/>
+                    <a:lstStyle/>
+                    <a:p>
+                      <a:endParaRPr lang="de-DE" sz="1800" b="0"/>
+                    </a:p>
+                  </a:txBody>
+                  <a:tcPr>
+                    <a:lnL w="12700" cap="flat" cmpd="sng" algn="ctr">
+                      <a:solidFill>
+                        <a:schemeClr val="tx1"/>
+                      </a:solidFill>
+                      <a:prstDash val="solid"/>
+                      <a:round/>
+                      <a:headEnd type="none" w="med" len="med"/>
+                      <a:tailEnd type="none" w="med" len="med"/>
+                    </a:lnL>
+                    <a:lnR w="12700" cap="flat" cmpd="sng" algn="ctr">
+                      <a:solidFill>
+                        <a:schemeClr val="tx1"/>
+                      </a:solidFill>
+                      <a:prstDash val="solid"/>
+                      <a:round/>
+                      <a:headEnd type="none" w="med" len="med"/>
+                      <a:tailEnd type="none" w="med" len="med"/>
+                    </a:lnR>
+                    <a:lnT w="12700" cap="flat" cmpd="sng" algn="ctr">
+                      <a:solidFill>
+                        <a:schemeClr val="tx1"/>
+                      </a:solidFill>
+                      <a:prstDash val="solid"/>
+                      <a:round/>
+                      <a:headEnd type="none" w="med" len="med"/>
+                      <a:tailEnd type="none" w="med" len="med"/>
+                    </a:lnT>
+                    <a:lnB w="12700" cap="flat" cmpd="sng" algn="ctr">
+                      <a:solidFill>
+                        <a:schemeClr val="tx1"/>
+                      </a:solidFill>
+                      <a:prstDash val="solid"/>
+                      <a:round/>
+                      <a:headEnd type="none" w="med" len="med"/>
+                      <a:tailEnd type="none" w="med" len="med"/>
+                    </a:lnB>
+                    <a:solidFill>
+                      <a:schemeClr val="bg1"/>
+                    </a:solidFill>
+                  </a:tcPr>
+                </a:tc>
+                <a:extLst>
+                  <a:ext uri="{0D108BD9-81ED-4DB2-BD59-A6C34878D82A}">
+                    <a16:rowId xmlns:a16="http://schemas.microsoft.com/office/drawing/2014/main" xmlns="" val="3460220147"/>
+                  </a:ext>
+                </a:extLst>
+              </a:tr>
+              <a:tr h="947163">
+                <a:tc>
+                  <a:txBody>
+                    <a:bodyPr/>
+                    <a:lstStyle/>
+                    <a:p>
+                      <a:r>
+                        <a:rPr lang="de-DE" sz="1800" b="0" dirty="0"/>
+                        <a:t>niedrig</a:t>
+                      </a:r>
+                    </a:p>
+                  </a:txBody>
+                  <a:tcPr>
+                    <a:lnL w="12700" cap="flat" cmpd="sng" algn="ctr">
+                      <a:noFill/>
+                      <a:prstDash val="solid"/>
+                      <a:round/>
+                      <a:headEnd type="none" w="med" len="med"/>
+                      <a:tailEnd type="none" w="med" len="med"/>
+                    </a:lnL>
+                    <a:lnR w="12700" cap="flat" cmpd="sng" algn="ctr">
+                      <a:solidFill>
+                        <a:schemeClr val="tx1"/>
+                      </a:solidFill>
+                      <a:prstDash val="solid"/>
+                      <a:round/>
+                      <a:headEnd type="none" w="med" len="med"/>
+                      <a:tailEnd type="none" w="med" len="med"/>
+                    </a:lnR>
+                    <a:lnT w="12700" cap="flat" cmpd="sng" algn="ctr">
+                      <a:noFill/>
+                      <a:prstDash val="solid"/>
+                      <a:round/>
+                      <a:headEnd type="none" w="med" len="med"/>
+                      <a:tailEnd type="none" w="med" len="med"/>
+                    </a:lnT>
+                    <a:lnB w="12700" cap="flat" cmpd="sng" algn="ctr">
+                      <a:noFill/>
+                      <a:prstDash val="solid"/>
+                      <a:round/>
+                      <a:headEnd type="none" w="med" len="med"/>
+                      <a:tailEnd type="none" w="med" len="med"/>
+                    </a:lnB>
+                    <a:lnTlToBr w="12700" cmpd="sng">
+                      <a:noFill/>
+                      <a:prstDash val="solid"/>
+                    </a:lnTlToBr>
+                    <a:lnBlToTr w="12700" cmpd="sng">
+                      <a:noFill/>
+                      <a:prstDash val="solid"/>
+                    </a:lnBlToTr>
+                    <a:solidFill>
+                      <a:schemeClr val="bg1"/>
+                    </a:solidFill>
+                  </a:tcPr>
+                </a:tc>
+                <a:tc>
+                  <a:txBody>
+                    <a:bodyPr/>
+                    <a:lstStyle/>
+                    <a:p>
+                      <a:endParaRPr lang="de-DE" sz="1800" b="0" dirty="0"/>
+                    </a:p>
+                  </a:txBody>
+                  <a:tcPr>
+                    <a:lnL w="12700" cap="flat" cmpd="sng" algn="ctr">
+                      <a:solidFill>
+                        <a:schemeClr val="tx1"/>
+                      </a:solidFill>
+                      <a:prstDash val="solid"/>
+                      <a:round/>
+                      <a:headEnd type="none" w="med" len="med"/>
+                      <a:tailEnd type="none" w="med" len="med"/>
+                    </a:lnL>
+                    <a:lnR w="12700" cap="flat" cmpd="sng" algn="ctr">
+                      <a:solidFill>
+                        <a:schemeClr val="tx1"/>
+                      </a:solidFill>
+                      <a:prstDash val="solid"/>
+                      <a:round/>
+                      <a:headEnd type="none" w="med" len="med"/>
+                      <a:tailEnd type="none" w="med" len="med"/>
+                    </a:lnR>
+                    <a:lnT w="12700" cap="flat" cmpd="sng" algn="ctr">
+                      <a:solidFill>
+                        <a:schemeClr val="tx1"/>
+                      </a:solidFill>
+                      <a:prstDash val="solid"/>
+                      <a:round/>
+                      <a:headEnd type="none" w="med" len="med"/>
+                      <a:tailEnd type="none" w="med" len="med"/>
+                    </a:lnT>
+                    <a:lnB w="12700" cap="flat" cmpd="sng" algn="ctr">
+                      <a:solidFill>
+                        <a:schemeClr val="tx1"/>
+                      </a:solidFill>
+                      <a:prstDash val="solid"/>
+                      <a:round/>
+                      <a:headEnd type="none" w="med" len="med"/>
+                      <a:tailEnd type="none" w="med" len="med"/>
+                    </a:lnB>
+                    <a:solidFill>
+                      <a:schemeClr val="bg1"/>
+                    </a:solidFill>
+                  </a:tcPr>
+                </a:tc>
+                <a:tc>
+                  <a:txBody>
+                    <a:bodyPr/>
+                    <a:lstStyle/>
+                    <a:p>
+                      <a:endParaRPr lang="de-DE" sz="1800" b="0"/>
+                    </a:p>
+                  </a:txBody>
+                  <a:tcPr>
+                    <a:lnL w="12700" cap="flat" cmpd="sng" algn="ctr">
+                      <a:solidFill>
+                        <a:schemeClr val="tx1"/>
+                      </a:solidFill>
+                      <a:prstDash val="solid"/>
+                      <a:round/>
+                      <a:headEnd type="none" w="med" len="med"/>
+                      <a:tailEnd type="none" w="med" len="med"/>
+                    </a:lnL>
+                    <a:lnR w="12700" cap="flat" cmpd="sng" algn="ctr">
+                      <a:solidFill>
+                        <a:schemeClr val="tx1"/>
+                      </a:solidFill>
+                      <a:prstDash val="solid"/>
+                      <a:round/>
+                      <a:headEnd type="none" w="med" len="med"/>
+                      <a:tailEnd type="none" w="med" len="med"/>
+                    </a:lnR>
+                    <a:lnT w="12700" cap="flat" cmpd="sng" algn="ctr">
+                      <a:solidFill>
+                        <a:schemeClr val="tx1"/>
+                      </a:solidFill>
+                      <a:prstDash val="solid"/>
+                      <a:round/>
+                      <a:headEnd type="none" w="med" len="med"/>
+                      <a:tailEnd type="none" w="med" len="med"/>
+                    </a:lnT>
+                    <a:lnB w="12700" cap="flat" cmpd="sng" algn="ctr">
+                      <a:solidFill>
+                        <a:schemeClr val="tx1"/>
+                      </a:solidFill>
+                      <a:prstDash val="solid"/>
+                      <a:round/>
+                      <a:headEnd type="none" w="med" len="med"/>
+                      <a:tailEnd type="none" w="med" len="med"/>
+                    </a:lnB>
+                    <a:solidFill>
+                      <a:schemeClr val="bg1"/>
+                    </a:solidFill>
+                  </a:tcPr>
+                </a:tc>
+                <a:tc>
+                  <a:txBody>
+                    <a:bodyPr/>
+                    <a:lstStyle/>
+                    <a:p>
+                      <a:endParaRPr lang="de-DE" sz="1800" b="0" dirty="0"/>
+                    </a:p>
+                  </a:txBody>
+                  <a:tcPr>
+                    <a:lnL w="12700" cap="flat" cmpd="sng" algn="ctr">
+                      <a:solidFill>
+                        <a:schemeClr val="tx1"/>
+                      </a:solidFill>
+                      <a:prstDash val="solid"/>
+                      <a:round/>
+                      <a:headEnd type="none" w="med" len="med"/>
+                      <a:tailEnd type="none" w="med" len="med"/>
+                    </a:lnL>
+                    <a:lnR w="12700" cap="flat" cmpd="sng" algn="ctr">
+                      <a:solidFill>
+                        <a:schemeClr val="tx1"/>
+                      </a:solidFill>
+                      <a:prstDash val="solid"/>
+                      <a:round/>
+                      <a:headEnd type="none" w="med" len="med"/>
+                      <a:tailEnd type="none" w="med" len="med"/>
+                    </a:lnR>
+                    <a:lnT w="12700" cap="flat" cmpd="sng" algn="ctr">
+                      <a:solidFill>
+                        <a:schemeClr val="tx1"/>
+                      </a:solidFill>
+                      <a:prstDash val="solid"/>
+                      <a:round/>
+                      <a:headEnd type="none" w="med" len="med"/>
+                      <a:tailEnd type="none" w="med" len="med"/>
+                    </a:lnT>
+                    <a:lnB w="12700" cap="flat" cmpd="sng" algn="ctr">
+                      <a:solidFill>
+                        <a:schemeClr val="tx1"/>
+                      </a:solidFill>
+                      <a:prstDash val="solid"/>
+                      <a:round/>
+                      <a:headEnd type="none" w="med" len="med"/>
+                      <a:tailEnd type="none" w="med" len="med"/>
+                    </a:lnB>
+                    <a:solidFill>
+                      <a:schemeClr val="bg1"/>
+                    </a:solidFill>
+                  </a:tcPr>
+                </a:tc>
+                <a:tc>
+                  <a:txBody>
+                    <a:bodyPr/>
+                    <a:lstStyle/>
+                    <a:p>
+                      <a:endParaRPr lang="de-DE" sz="1800" b="0" dirty="0"/>
+                    </a:p>
+                  </a:txBody>
+                  <a:tcPr>
+                    <a:lnL w="12700" cap="flat" cmpd="sng" algn="ctr">
+                      <a:solidFill>
+                        <a:schemeClr val="tx1"/>
+                      </a:solidFill>
+                      <a:prstDash val="solid"/>
+                      <a:round/>
+                      <a:headEnd type="none" w="med" len="med"/>
+                      <a:tailEnd type="none" w="med" len="med"/>
+                    </a:lnL>
+                    <a:lnR w="12700" cap="flat" cmpd="sng" algn="ctr">
+                      <a:solidFill>
+                        <a:schemeClr val="tx1"/>
+                      </a:solidFill>
+                      <a:prstDash val="solid"/>
+                      <a:round/>
+                      <a:headEnd type="none" w="med" len="med"/>
+                      <a:tailEnd type="none" w="med" len="med"/>
+                    </a:lnR>
+                    <a:lnT w="12700" cap="flat" cmpd="sng" algn="ctr">
+                      <a:solidFill>
+                        <a:schemeClr val="tx1"/>
+                      </a:solidFill>
+                      <a:prstDash val="solid"/>
+                      <a:round/>
+                      <a:headEnd type="none" w="med" len="med"/>
+                      <a:tailEnd type="none" w="med" len="med"/>
+                    </a:lnT>
+                    <a:lnB w="12700" cap="flat" cmpd="sng" algn="ctr">
+                      <a:solidFill>
+                        <a:schemeClr val="tx1"/>
+                      </a:solidFill>
+                      <a:prstDash val="solid"/>
+                      <a:round/>
+                      <a:headEnd type="none" w="med" len="med"/>
+                      <a:tailEnd type="none" w="med" len="med"/>
+                    </a:lnB>
+                    <a:solidFill>
+                      <a:schemeClr val="bg1"/>
+                    </a:solidFill>
+                  </a:tcPr>
+                </a:tc>
+                <a:extLst>
+                  <a:ext uri="{0D108BD9-81ED-4DB2-BD59-A6C34878D82A}">
+                    <a16:rowId xmlns:a16="http://schemas.microsoft.com/office/drawing/2014/main" xmlns="" val="3858569593"/>
+                  </a:ext>
+                </a:extLst>
+              </a:tr>
+              <a:tr h="947163">
+                <a:tc>
+                  <a:txBody>
+                    <a:bodyPr/>
+                    <a:lstStyle/>
+                    <a:p>
+                      <a:endParaRPr lang="de-DE" sz="1800" b="0" dirty="0"/>
+                    </a:p>
+                  </a:txBody>
+                  <a:tcPr>
+                    <a:lnL w="12700" cap="flat" cmpd="sng" algn="ctr">
+                      <a:noFill/>
+                      <a:prstDash val="solid"/>
+                      <a:round/>
+                      <a:headEnd type="none" w="med" len="med"/>
+                      <a:tailEnd type="none" w="med" len="med"/>
+                    </a:lnL>
+                    <a:lnR w="12700" cap="flat" cmpd="sng" algn="ctr">
+                      <a:noFill/>
+                      <a:prstDash val="solid"/>
+                      <a:round/>
+                      <a:headEnd type="none" w="med" len="med"/>
+                      <a:tailEnd type="none" w="med" len="med"/>
+                    </a:lnR>
+                    <a:lnT w="12700" cap="flat" cmpd="sng" algn="ctr">
+                      <a:noFill/>
+                      <a:prstDash val="solid"/>
+                      <a:round/>
+                      <a:headEnd type="none" w="med" len="med"/>
+                      <a:tailEnd type="none" w="med" len="med"/>
+                    </a:lnT>
+                    <a:lnB w="12700" cap="flat" cmpd="sng" algn="ctr">
+                      <a:noFill/>
+                      <a:prstDash val="solid"/>
+                      <a:round/>
+                      <a:headEnd type="none" w="med" len="med"/>
+                      <a:tailEnd type="none" w="med" len="med"/>
+                    </a:lnB>
+                    <a:lnTlToBr w="12700" cmpd="sng">
+                      <a:noFill/>
+                      <a:prstDash val="solid"/>
+                    </a:lnTlToBr>
+                    <a:lnBlToTr w="12700" cmpd="sng">
+                      <a:noFill/>
+                      <a:prstDash val="solid"/>
+                    </a:lnBlToTr>
+                    <a:solidFill>
+                      <a:schemeClr val="bg1"/>
+                    </a:solidFill>
+                  </a:tcPr>
+                </a:tc>
+                <a:tc>
+                  <a:txBody>
+                    <a:bodyPr/>
+                    <a:lstStyle/>
+                    <a:p>
+                      <a:r>
+                        <a:rPr lang="de-DE" sz="1800" b="0" dirty="0"/>
+                        <a:t>gering</a:t>
+                      </a:r>
+                    </a:p>
+                  </a:txBody>
+                  <a:tcPr>
+                    <a:lnL w="12700" cap="flat" cmpd="sng" algn="ctr">
+                      <a:noFill/>
+                      <a:prstDash val="solid"/>
+                      <a:round/>
+                      <a:headEnd type="none" w="med" len="med"/>
+                      <a:tailEnd type="none" w="med" len="med"/>
+                    </a:lnL>
+                    <a:lnR w="12700" cap="flat" cmpd="sng" algn="ctr">
+                      <a:noFill/>
+                      <a:prstDash val="solid"/>
+                      <a:round/>
+                      <a:headEnd type="none" w="med" len="med"/>
+                      <a:tailEnd type="none" w="med" len="med"/>
+                    </a:lnR>
+                    <a:lnT w="12700" cap="flat" cmpd="sng" algn="ctr">
+                      <a:solidFill>
+                        <a:schemeClr val="tx1"/>
+                      </a:solidFill>
+                      <a:prstDash val="solid"/>
+                      <a:round/>
+                      <a:headEnd type="none" w="med" len="med"/>
+                      <a:tailEnd type="none" w="med" len="med"/>
+                    </a:lnT>
+                    <a:lnB w="12700" cap="flat" cmpd="sng" algn="ctr">
+                      <a:noFill/>
+                      <a:prstDash val="solid"/>
+                      <a:round/>
+                      <a:headEnd type="none" w="med" len="med"/>
+                      <a:tailEnd type="none" w="med" len="med"/>
+                    </a:lnB>
+                    <a:lnTlToBr w="12700" cmpd="sng">
+                      <a:noFill/>
+                      <a:prstDash val="solid"/>
+                    </a:lnTlToBr>
+                    <a:lnBlToTr w="12700" cmpd="sng">
+                      <a:noFill/>
+                      <a:prstDash val="solid"/>
+                    </a:lnBlToTr>
+                    <a:solidFill>
+                      <a:schemeClr val="bg1"/>
+                    </a:solidFill>
+                  </a:tcPr>
+                </a:tc>
+                <a:tc>
+                  <a:txBody>
+                    <a:bodyPr/>
+                    <a:lstStyle/>
+                    <a:p>
+                      <a:r>
+                        <a:rPr lang="de-DE" sz="1800" b="0" dirty="0"/>
+                        <a:t>eher gering</a:t>
+                      </a:r>
+                    </a:p>
+                  </a:txBody>
+                  <a:tcPr>
+                    <a:lnL w="12700" cap="flat" cmpd="sng" algn="ctr">
+                      <a:noFill/>
+                      <a:prstDash val="solid"/>
+                      <a:round/>
+                      <a:headEnd type="none" w="med" len="med"/>
+                      <a:tailEnd type="none" w="med" len="med"/>
+                    </a:lnL>
+                    <a:lnR w="12700" cap="flat" cmpd="sng" algn="ctr">
+                      <a:noFill/>
+                      <a:prstDash val="solid"/>
+                      <a:round/>
+                      <a:headEnd type="none" w="med" len="med"/>
+                      <a:tailEnd type="none" w="med" len="med"/>
+                    </a:lnR>
+                    <a:lnT w="12700" cap="flat" cmpd="sng" algn="ctr">
+                      <a:solidFill>
+                        <a:schemeClr val="tx1"/>
+                      </a:solidFill>
+                      <a:prstDash val="solid"/>
+                      <a:round/>
+                      <a:headEnd type="none" w="med" len="med"/>
+                      <a:tailEnd type="none" w="med" len="med"/>
+                    </a:lnT>
+                    <a:lnB w="12700" cap="flat" cmpd="sng" algn="ctr">
+                      <a:noFill/>
+                      <a:prstDash val="solid"/>
+                      <a:round/>
+                      <a:headEnd type="none" w="med" len="med"/>
+                      <a:tailEnd type="none" w="med" len="med"/>
+                    </a:lnB>
+                    <a:lnTlToBr w="12700" cmpd="sng">
+                      <a:noFill/>
+                      <a:prstDash val="solid"/>
+                    </a:lnTlToBr>
+                    <a:lnBlToTr w="12700" cmpd="sng">
+                      <a:noFill/>
+                      <a:prstDash val="solid"/>
+                    </a:lnBlToTr>
+                    <a:solidFill>
+                      <a:schemeClr val="bg1"/>
+                    </a:solidFill>
+                  </a:tcPr>
+                </a:tc>
+                <a:tc>
+                  <a:txBody>
+                    <a:bodyPr/>
+                    <a:lstStyle/>
+                    <a:p>
+                      <a:r>
+                        <a:rPr lang="de-DE" sz="1800" b="0" dirty="0"/>
+                        <a:t>eher hoch</a:t>
+                      </a:r>
+                    </a:p>
+                  </a:txBody>
+                  <a:tcPr>
+                    <a:lnL w="12700" cap="flat" cmpd="sng" algn="ctr">
+                      <a:noFill/>
+                      <a:prstDash val="solid"/>
+                      <a:round/>
+                      <a:headEnd type="none" w="med" len="med"/>
+                      <a:tailEnd type="none" w="med" len="med"/>
+                    </a:lnL>
+                    <a:lnR w="12700" cap="flat" cmpd="sng" algn="ctr">
+                      <a:noFill/>
+                      <a:prstDash val="solid"/>
+                      <a:round/>
+                      <a:headEnd type="none" w="med" len="med"/>
+                      <a:tailEnd type="none" w="med" len="med"/>
+                    </a:lnR>
+                    <a:lnT w="12700" cap="flat" cmpd="sng" algn="ctr">
+                      <a:solidFill>
+                        <a:schemeClr val="tx1"/>
+                      </a:solidFill>
+                      <a:prstDash val="solid"/>
+                      <a:round/>
+                      <a:headEnd type="none" w="med" len="med"/>
+                      <a:tailEnd type="none" w="med" len="med"/>
+                    </a:lnT>
+                    <a:lnB w="12700" cap="flat" cmpd="sng" algn="ctr">
+                      <a:noFill/>
+                      <a:prstDash val="solid"/>
+                      <a:round/>
+                      <a:headEnd type="none" w="med" len="med"/>
+                      <a:tailEnd type="none" w="med" len="med"/>
+                    </a:lnB>
+                    <a:lnTlToBr w="12700" cmpd="sng">
+                      <a:noFill/>
+                      <a:prstDash val="solid"/>
+                    </a:lnTlToBr>
+                    <a:lnBlToTr w="12700" cmpd="sng">
+                      <a:noFill/>
+                      <a:prstDash val="solid"/>
+                    </a:lnBlToTr>
+                    <a:solidFill>
+                      <a:schemeClr val="bg1"/>
+                    </a:solidFill>
+                  </a:tcPr>
+                </a:tc>
+                <a:tc>
+                  <a:txBody>
+                    <a:bodyPr/>
+                    <a:lstStyle/>
+                    <a:p>
+                      <a:r>
+                        <a:rPr lang="de-DE" sz="1800" b="0" dirty="0"/>
+                        <a:t>hoch</a:t>
+                      </a:r>
+                    </a:p>
+                  </a:txBody>
+                  <a:tcPr>
+                    <a:lnL w="12700" cap="flat" cmpd="sng" algn="ctr">
+                      <a:noFill/>
+                      <a:prstDash val="solid"/>
+                      <a:round/>
+                      <a:headEnd type="none" w="med" len="med"/>
+                      <a:tailEnd type="none" w="med" len="med"/>
+                    </a:lnL>
+                    <a:lnR w="12700" cap="flat" cmpd="sng" algn="ctr">
+                      <a:noFill/>
+                      <a:prstDash val="solid"/>
+                      <a:round/>
+                      <a:headEnd type="none" w="med" len="med"/>
+                      <a:tailEnd type="none" w="med" len="med"/>
+                    </a:lnR>
+                    <a:lnT w="12700" cap="flat" cmpd="sng" algn="ctr">
+                      <a:solidFill>
+                        <a:schemeClr val="tx1"/>
+                      </a:solidFill>
+                      <a:prstDash val="solid"/>
+                      <a:round/>
+                      <a:headEnd type="none" w="med" len="med"/>
+                      <a:tailEnd type="none" w="med" len="med"/>
+                    </a:lnT>
+                    <a:lnB w="12700" cap="flat" cmpd="sng" algn="ctr">
+                      <a:noFill/>
+                      <a:prstDash val="solid"/>
+                      <a:round/>
+                      <a:headEnd type="none" w="med" len="med"/>
+                      <a:tailEnd type="none" w="med" len="med"/>
+                    </a:lnB>
+                    <a:lnTlToBr w="12700" cmpd="sng">
+                      <a:noFill/>
+                      <a:prstDash val="solid"/>
+                    </a:lnTlToBr>
+                    <a:lnBlToTr w="12700" cmpd="sng">
+                      <a:noFill/>
+                      <a:prstDash val="solid"/>
+                    </a:lnBlToTr>
+                    <a:solidFill>
+                      <a:schemeClr val="bg1"/>
+                    </a:solidFill>
+                  </a:tcPr>
+                </a:tc>
+                <a:extLst>
+                  <a:ext uri="{0D108BD9-81ED-4DB2-BD59-A6C34878D82A}">
+                    <a16:rowId xmlns:a16="http://schemas.microsoft.com/office/drawing/2014/main" xmlns="" val="574562269"/>
+                  </a:ext>
+                </a:extLst>
+              </a:tr>
+            </a:tbl>
+          </a:graphicData>
+        </a:graphic>
+      </p:graphicFrame>
+      <p:sp>
+        <p:nvSpPr>
+          <p:cNvPr id="7" name="Textfeld 6"/>
+          <p:cNvSpPr txBox="1"/>
+          <p:nvPr/>
+        </p:nvSpPr>
+        <p:spPr>
+          <a:xfrm>
+            <a:off x="838200" y="1456290"/>
+            <a:ext cx="2040924" cy="369332"/>
+          </a:xfrm>
+          <a:prstGeom prst="rect">
+            <a:avLst/>
+          </a:prstGeom>
+          <a:noFill/>
+        </p:spPr>
+        <p:txBody>
+          <a:bodyPr wrap="square" rtlCol="0">
+            <a:spAutoFit/>
+          </a:bodyPr>
+          <a:lstStyle/>
+          <a:p>
+            <a:r>
+              <a:rPr lang="de-DE" b="1" dirty="0"/>
+              <a:t>Tragweite</a:t>
+            </a:r>
+          </a:p>
+        </p:txBody>
+      </p:sp>
+      <p:sp>
+        <p:nvSpPr>
+          <p:cNvPr id="8" name="Textfeld 7"/>
+          <p:cNvSpPr txBox="1"/>
+          <p:nvPr/>
+        </p:nvSpPr>
+        <p:spPr>
+          <a:xfrm>
+            <a:off x="9354065" y="6020053"/>
+            <a:ext cx="2837935" cy="369332"/>
+          </a:xfrm>
+          <a:prstGeom prst="rect">
+            <a:avLst/>
+          </a:prstGeom>
+          <a:noFill/>
+        </p:spPr>
+        <p:txBody>
+          <a:bodyPr wrap="square" rtlCol="0">
+            <a:spAutoFit/>
+          </a:bodyPr>
+          <a:lstStyle/>
+          <a:p>
+            <a:r>
+              <a:rPr lang="de-DE" b="1" dirty="0"/>
+              <a:t>Eintrittswahrscheinlichkeit</a:t>
+            </a:r>
+          </a:p>
+        </p:txBody>
+      </p:sp>
+      <p:sp>
+        <p:nvSpPr>
+          <p:cNvPr id="9" name="Ellipse 8"/>
+          <p:cNvSpPr/>
+          <p:nvPr/>
+        </p:nvSpPr>
+        <p:spPr>
+          <a:xfrm>
+            <a:off x="8773297" y="3150973"/>
+            <a:ext cx="951471" cy="803189"/>
+          </a:xfrm>
+          <a:prstGeom prst="ellipse">
+            <a:avLst/>
+          </a:prstGeom>
+        </p:spPr>
+        <p:style>
+          <a:lnRef idx="2">
+            <a:schemeClr val="accent2">
+              <a:shade val="50000"/>
+            </a:schemeClr>
+          </a:lnRef>
+          <a:fillRef idx="1">
+            <a:schemeClr val="accent2"/>
+          </a:fillRef>
+          <a:effectRef idx="0">
+            <a:schemeClr val="accent2"/>
+          </a:effectRef>
+          <a:fontRef idx="minor">
+            <a:schemeClr val="lt1"/>
+          </a:fontRef>
+        </p:style>
+        <p:txBody>
+          <a:bodyPr rtlCol="0" anchor="ctr"/>
+          <a:lstStyle/>
+          <a:p>
+            <a:pPr algn="ctr"/>
+            <a:r>
+              <a:rPr lang="de-DE" sz="1200" dirty="0"/>
+              <a:t>Zeit</a:t>
+            </a:r>
+          </a:p>
+        </p:txBody>
+      </p:sp>
+      <p:sp>
+        <p:nvSpPr>
+          <p:cNvPr id="10" name="Ellipse 9"/>
+          <p:cNvSpPr/>
+          <p:nvPr/>
+        </p:nvSpPr>
+        <p:spPr>
+          <a:xfrm>
+            <a:off x="3484606" y="4695567"/>
+            <a:ext cx="1037967" cy="840260"/>
+          </a:xfrm>
+          <a:prstGeom prst="ellipse">
+            <a:avLst/>
+          </a:prstGeom>
+        </p:spPr>
+        <p:style>
+          <a:lnRef idx="2">
+            <a:schemeClr val="accent2">
+              <a:shade val="50000"/>
+            </a:schemeClr>
+          </a:lnRef>
+          <a:fillRef idx="1">
+            <a:schemeClr val="accent2"/>
+          </a:fillRef>
+          <a:effectRef idx="0">
+            <a:schemeClr val="accent2"/>
+          </a:effectRef>
+          <a:fontRef idx="minor">
+            <a:schemeClr val="lt1"/>
+          </a:fontRef>
+        </p:style>
+        <p:txBody>
+          <a:bodyPr rtlCol="0" anchor="ctr"/>
+          <a:lstStyle/>
+          <a:p>
+            <a:pPr algn="ctr"/>
+            <a:r>
+              <a:rPr lang="de-DE" sz="1200" dirty="0"/>
+              <a:t>Abbruch</a:t>
+            </a:r>
+          </a:p>
+        </p:txBody>
+      </p:sp>
+      <p:sp>
+        <p:nvSpPr>
+          <p:cNvPr id="11" name="Ellipse 10"/>
+          <p:cNvSpPr/>
+          <p:nvPr/>
+        </p:nvSpPr>
+        <p:spPr>
+          <a:xfrm>
+            <a:off x="9938951" y="2240692"/>
+            <a:ext cx="951471" cy="803189"/>
+          </a:xfrm>
+          <a:prstGeom prst="ellipse">
+            <a:avLst/>
+          </a:prstGeom>
+        </p:spPr>
+        <p:style>
+          <a:lnRef idx="2">
+            <a:schemeClr val="accent6">
+              <a:shade val="50000"/>
+            </a:schemeClr>
+          </a:lnRef>
+          <a:fillRef idx="1">
+            <a:schemeClr val="accent6"/>
+          </a:fillRef>
+          <a:effectRef idx="0">
+            <a:schemeClr val="accent6"/>
+          </a:effectRef>
+          <a:fontRef idx="minor">
+            <a:schemeClr val="lt1"/>
+          </a:fontRef>
+        </p:style>
+        <p:txBody>
+          <a:bodyPr rtlCol="0" anchor="ctr"/>
+          <a:lstStyle/>
+          <a:p>
+            <a:pPr algn="ctr"/>
+            <a:r>
+              <a:rPr lang="de-DE" sz="1100" dirty="0" err="1"/>
+              <a:t>Erfas-sung</a:t>
+            </a:r>
+            <a:r>
+              <a:rPr lang="de-DE" sz="1100" dirty="0"/>
+              <a:t> Projekte</a:t>
+            </a:r>
+          </a:p>
+        </p:txBody>
+      </p:sp>
+      <p:sp>
+        <p:nvSpPr>
+          <p:cNvPr id="12" name="Ellipse 11"/>
+          <p:cNvSpPr/>
+          <p:nvPr/>
+        </p:nvSpPr>
+        <p:spPr>
+          <a:xfrm>
+            <a:off x="8184292" y="4454610"/>
+            <a:ext cx="951471" cy="803189"/>
+          </a:xfrm>
+          <a:prstGeom prst="ellipse">
+            <a:avLst/>
+          </a:prstGeom>
+        </p:spPr>
+        <p:style>
+          <a:lnRef idx="2">
+            <a:schemeClr val="accent6">
+              <a:shade val="50000"/>
+            </a:schemeClr>
+          </a:lnRef>
+          <a:fillRef idx="1">
+            <a:schemeClr val="accent6"/>
+          </a:fillRef>
+          <a:effectRef idx="0">
+            <a:schemeClr val="accent6"/>
+          </a:effectRef>
+          <a:fontRef idx="minor">
+            <a:schemeClr val="lt1"/>
+          </a:fontRef>
+        </p:style>
+        <p:txBody>
+          <a:bodyPr rtlCol="0" anchor="ctr"/>
+          <a:lstStyle/>
+          <a:p>
+            <a:pPr algn="ctr"/>
+            <a:r>
+              <a:rPr lang="de-DE" sz="1200" dirty="0"/>
+              <a:t>Über-sicht</a:t>
+            </a:r>
+          </a:p>
+        </p:txBody>
+      </p:sp>
+      <p:sp>
+        <p:nvSpPr>
+          <p:cNvPr id="13" name="Ellipse 12"/>
+          <p:cNvSpPr/>
+          <p:nvPr/>
+        </p:nvSpPr>
+        <p:spPr>
+          <a:xfrm>
+            <a:off x="9830830" y="3756578"/>
+            <a:ext cx="951471" cy="803189"/>
+          </a:xfrm>
+          <a:prstGeom prst="ellipse">
+            <a:avLst/>
+          </a:prstGeom>
+        </p:spPr>
+        <p:style>
+          <a:lnRef idx="2">
+            <a:schemeClr val="accent6">
+              <a:shade val="50000"/>
+            </a:schemeClr>
+          </a:lnRef>
+          <a:fillRef idx="1">
+            <a:schemeClr val="accent6"/>
+          </a:fillRef>
+          <a:effectRef idx="0">
+            <a:schemeClr val="accent6"/>
+          </a:effectRef>
+          <a:fontRef idx="minor">
+            <a:schemeClr val="lt1"/>
+          </a:fontRef>
+        </p:style>
+        <p:txBody>
+          <a:bodyPr rtlCol="0" anchor="ctr"/>
+          <a:lstStyle/>
+          <a:p>
+            <a:pPr algn="ctr"/>
+            <a:r>
+              <a:rPr lang="de-DE" sz="1200" dirty="0"/>
+              <a:t>Budget-plan</a:t>
+            </a:r>
+          </a:p>
+        </p:txBody>
+      </p:sp>
+      <p:sp>
+        <p:nvSpPr>
+          <p:cNvPr id="14" name="Ellipse 13"/>
+          <p:cNvSpPr/>
+          <p:nvPr/>
+        </p:nvSpPr>
+        <p:spPr>
+          <a:xfrm>
+            <a:off x="5620264" y="1931773"/>
+            <a:ext cx="951471" cy="803189"/>
+          </a:xfrm>
+          <a:prstGeom prst="ellipse">
+            <a:avLst/>
+          </a:prstGeom>
+        </p:spPr>
+        <p:style>
+          <a:lnRef idx="2">
+            <a:schemeClr val="accent2">
+              <a:shade val="50000"/>
+            </a:schemeClr>
+          </a:lnRef>
+          <a:fillRef idx="1">
+            <a:schemeClr val="accent2"/>
+          </a:fillRef>
+          <a:effectRef idx="0">
+            <a:schemeClr val="accent2"/>
+          </a:effectRef>
+          <a:fontRef idx="minor">
+            <a:schemeClr val="lt1"/>
+          </a:fontRef>
+        </p:style>
+        <p:txBody>
+          <a:bodyPr rtlCol="0" anchor="ctr"/>
+          <a:lstStyle/>
+          <a:p>
+            <a:pPr algn="ctr"/>
+            <a:r>
+              <a:rPr lang="de-DE" sz="1200" dirty="0" err="1"/>
+              <a:t>Kon-kurrenz</a:t>
+            </a:r>
+            <a:endParaRPr lang="de-DE" sz="1200" dirty="0"/>
+          </a:p>
+        </p:txBody>
+      </p:sp>
+    </p:spTree>
+    <p:extLst>
+      <p:ext uri="{BB962C8B-B14F-4D97-AF65-F5344CB8AC3E}">
+        <p14:creationId xmlns:p14="http://schemas.microsoft.com/office/powerpoint/2010/main" val="2873840976"/>
+      </p:ext>
+    </p:extLst>
+  </p:cSld>
+  <p:clrMapOvr>
+    <a:masterClrMapping/>
+  </p:clrMapOvr>
+</p:sld>
+</file>
+
+<file path=ppt/slides/slide12.xml><?xml version="1.0" encoding="utf-8"?>
+<p:sld xmlns:a="http://schemas.openxmlformats.org/drawingml/2006/main" xmlns:r="http://schemas.openxmlformats.org/officeDocument/2006/relationships" xmlns:p="http://schemas.openxmlformats.org/presentationml/2006/main">
+  <p:cSld>
+    <p:spTree>
+      <p:nvGrpSpPr>
+        <p:cNvPr id="1" name=""/>
+        <p:cNvGrpSpPr/>
+        <p:nvPr/>
+      </p:nvGrpSpPr>
+      <p:grpSpPr>
+        <a:xfrm>
+          <a:off x="0" y="0"/>
+          <a:ext cx="0" cy="0"/>
+          <a:chOff x="0" y="0"/>
+          <a:chExt cx="0" cy="0"/>
+        </a:xfrm>
+      </p:grpSpPr>
+      <p:sp>
+        <p:nvSpPr>
+          <p:cNvPr id="4" name="Titel 3"/>
+          <p:cNvSpPr>
+            <a:spLocks noGrp="1"/>
+          </p:cNvSpPr>
+          <p:nvPr>
+            <p:ph type="title"/>
+          </p:nvPr>
+        </p:nvSpPr>
+        <p:spPr/>
+        <p:txBody>
+          <a:bodyPr/>
+          <a:lstStyle/>
+          <a:p>
+            <a:r>
+              <a:rPr lang="de-DE" dirty="0"/>
               <a:t>Ziel SMART</a:t>
             </a:r>
           </a:p>
@@ -18640,14 +18268,14 @@
                 <a:gridCol w="5257800">
                   <a:extLst>
                     <a:ext uri="{9D8B030D-6E8A-4147-A177-3AD203B41FA5}">
-                      <a16:colId xmlns:a16="http://schemas.microsoft.com/office/drawing/2014/main" xmlns="" val="543071372"/>
+                      <a16:colId xmlns="" xmlns:a16="http://schemas.microsoft.com/office/drawing/2014/main" val="543071372"/>
                     </a:ext>
                   </a:extLst>
                 </a:gridCol>
                 <a:gridCol w="5257800">
                   <a:extLst>
                     <a:ext uri="{9D8B030D-6E8A-4147-A177-3AD203B41FA5}">
-                      <a16:colId xmlns:a16="http://schemas.microsoft.com/office/drawing/2014/main" xmlns="" val="750843462"/>
+                      <a16:colId xmlns="" xmlns:a16="http://schemas.microsoft.com/office/drawing/2014/main" val="750843462"/>
                     </a:ext>
                   </a:extLst>
                 </a:gridCol>
@@ -18750,7 +18378,7 @@
                 </a:tc>
                 <a:extLst>
                   <a:ext uri="{0D108BD9-81ED-4DB2-BD59-A6C34878D82A}">
-                    <a16:rowId xmlns:a16="http://schemas.microsoft.com/office/drawing/2014/main" xmlns="" val="592059295"/>
+                    <a16:rowId xmlns="" xmlns:a16="http://schemas.microsoft.com/office/drawing/2014/main" val="592059295"/>
                   </a:ext>
                 </a:extLst>
               </a:tr>
@@ -18820,7 +18448,7 @@
                 </a:tc>
                 <a:extLst>
                   <a:ext uri="{0D108BD9-81ED-4DB2-BD59-A6C34878D82A}">
-                    <a16:rowId xmlns:a16="http://schemas.microsoft.com/office/drawing/2014/main" xmlns="" val="3383136000"/>
+                    <a16:rowId xmlns="" xmlns:a16="http://schemas.microsoft.com/office/drawing/2014/main" val="3383136000"/>
                   </a:ext>
                 </a:extLst>
               </a:tr>
@@ -18903,7 +18531,7 @@
                 </a:tc>
                 <a:extLst>
                   <a:ext uri="{0D108BD9-81ED-4DB2-BD59-A6C34878D82A}">
-                    <a16:rowId xmlns:a16="http://schemas.microsoft.com/office/drawing/2014/main" xmlns="" val="2076048036"/>
+                    <a16:rowId xmlns="" xmlns:a16="http://schemas.microsoft.com/office/drawing/2014/main" val="2076048036"/>
                   </a:ext>
                 </a:extLst>
               </a:tr>
@@ -18965,7 +18593,7 @@
                 </a:tc>
                 <a:extLst>
                   <a:ext uri="{0D108BD9-81ED-4DB2-BD59-A6C34878D82A}">
-                    <a16:rowId xmlns:a16="http://schemas.microsoft.com/office/drawing/2014/main" xmlns="" val="3664696022"/>
+                    <a16:rowId xmlns="" xmlns:a16="http://schemas.microsoft.com/office/drawing/2014/main" val="3664696022"/>
                   </a:ext>
                 </a:extLst>
               </a:tr>
@@ -19032,7 +18660,7 @@
                 </a:tc>
                 <a:extLst>
                   <a:ext uri="{0D108BD9-81ED-4DB2-BD59-A6C34878D82A}">
-                    <a16:rowId xmlns:a16="http://schemas.microsoft.com/office/drawing/2014/main" xmlns="" val="2265614862"/>
+                    <a16:rowId xmlns="" xmlns:a16="http://schemas.microsoft.com/office/drawing/2014/main" val="2265614862"/>
                   </a:ext>
                 </a:extLst>
               </a:tr>
@@ -19882,7 +19510,6 @@
               <a:rPr lang="de-DE" dirty="0" smtClean="0"/>
               <a:t>1 Testserver</a:t>
             </a:r>
-            <a:endParaRPr lang="de-DE" dirty="0" smtClean="0"/>
           </a:p>
           <a:p>
             <a:pPr lvl="1"/>

</xml_diff>